<commit_message>
Cleared out the presentation and it is now ready for the new stuff.
</commit_message>
<xml_diff>
--- a/Documents/Presentations/Milestone 2 presentation.pptx
+++ b/Documents/Presentations/Milestone 2 presentation.pptx
@@ -6,20 +6,19 @@
   </p:sldMasterIdLst>
   <p:sldIdLst>
     <p:sldId id="256" r:id="rId2"/>
-    <p:sldId id="257" r:id="rId3"/>
-    <p:sldId id="266" r:id="rId4"/>
-    <p:sldId id="267" r:id="rId5"/>
-    <p:sldId id="268" r:id="rId6"/>
-    <p:sldId id="272" r:id="rId7"/>
-    <p:sldId id="273" r:id="rId8"/>
-    <p:sldId id="274" r:id="rId9"/>
-    <p:sldId id="269" r:id="rId10"/>
-    <p:sldId id="270" r:id="rId11"/>
-    <p:sldId id="271" r:id="rId12"/>
-    <p:sldId id="260" r:id="rId13"/>
-    <p:sldId id="262" r:id="rId14"/>
-    <p:sldId id="264" r:id="rId15"/>
-    <p:sldId id="265" r:id="rId16"/>
+    <p:sldId id="266" r:id="rId3"/>
+    <p:sldId id="267" r:id="rId4"/>
+    <p:sldId id="268" r:id="rId5"/>
+    <p:sldId id="272" r:id="rId6"/>
+    <p:sldId id="273" r:id="rId7"/>
+    <p:sldId id="274" r:id="rId8"/>
+    <p:sldId id="269" r:id="rId9"/>
+    <p:sldId id="270" r:id="rId10"/>
+    <p:sldId id="271" r:id="rId11"/>
+    <p:sldId id="260" r:id="rId12"/>
+    <p:sldId id="262" r:id="rId13"/>
+    <p:sldId id="264" r:id="rId14"/>
+    <p:sldId id="265" r:id="rId15"/>
   </p:sldIdLst>
   <p:sldSz cx="12192000" cy="6858000"/>
   <p:notesSz cx="6858000" cy="9144000"/>
@@ -249,7 +248,7 @@
             <a:fld id="{3F35B033-0387-4885-861A-442D43D51E29}" type="datetimeFigureOut">
               <a:rPr lang="en-US" smtClean="0"/>
               <a:pPr/>
-              <a:t>2/26/2014</a:t>
+              <a:t>3/19/2014</a:t>
             </a:fld>
             <a:endParaRPr lang="en-US"/>
           </a:p>
@@ -477,7 +476,7 @@
             <a:fld id="{3F35B033-0387-4885-861A-442D43D51E29}" type="datetimeFigureOut">
               <a:rPr lang="en-US" smtClean="0"/>
               <a:pPr/>
-              <a:t>2/26/2014</a:t>
+              <a:t>3/19/2014</a:t>
             </a:fld>
             <a:endParaRPr lang="en-US"/>
           </a:p>
@@ -654,7 +653,7 @@
             <a:fld id="{3F35B033-0387-4885-861A-442D43D51E29}" type="datetimeFigureOut">
               <a:rPr lang="en-US" smtClean="0"/>
               <a:pPr/>
-              <a:t>2/26/2014</a:t>
+              <a:t>3/19/2014</a:t>
             </a:fld>
             <a:endParaRPr lang="en-US"/>
           </a:p>
@@ -821,7 +820,7 @@
             <a:fld id="{3F35B033-0387-4885-861A-442D43D51E29}" type="datetimeFigureOut">
               <a:rPr lang="en-US" smtClean="0"/>
               <a:pPr/>
-              <a:t>2/26/2014</a:t>
+              <a:t>3/19/2014</a:t>
             </a:fld>
             <a:endParaRPr lang="en-US"/>
           </a:p>
@@ -1067,7 +1066,7 @@
             <a:fld id="{3F35B033-0387-4885-861A-442D43D51E29}" type="datetimeFigureOut">
               <a:rPr lang="en-US" smtClean="0"/>
               <a:pPr/>
-              <a:t>2/26/2014</a:t>
+              <a:t>3/19/2014</a:t>
             </a:fld>
             <a:endParaRPr lang="en-US"/>
           </a:p>
@@ -1333,7 +1332,7 @@
             <a:fld id="{3F35B033-0387-4885-861A-442D43D51E29}" type="datetimeFigureOut">
               <a:rPr lang="en-US" smtClean="0"/>
               <a:pPr/>
-              <a:t>2/26/2014</a:t>
+              <a:t>3/19/2014</a:t>
             </a:fld>
             <a:endParaRPr lang="en-US"/>
           </a:p>
@@ -1709,7 +1708,7 @@
             <a:fld id="{3F35B033-0387-4885-861A-442D43D51E29}" type="datetimeFigureOut">
               <a:rPr lang="en-US" smtClean="0"/>
               <a:pPr/>
-              <a:t>2/26/2014</a:t>
+              <a:t>3/19/2014</a:t>
             </a:fld>
             <a:endParaRPr lang="en-US"/>
           </a:p>
@@ -1824,7 +1823,7 @@
             <a:fld id="{3F35B033-0387-4885-861A-442D43D51E29}" type="datetimeFigureOut">
               <a:rPr lang="en-US" smtClean="0"/>
               <a:pPr/>
-              <a:t>2/26/2014</a:t>
+              <a:t>3/19/2014</a:t>
             </a:fld>
             <a:endParaRPr lang="en-US"/>
           </a:p>
@@ -1916,7 +1915,7 @@
             <a:fld id="{3F35B033-0387-4885-861A-442D43D51E29}" type="datetimeFigureOut">
               <a:rPr lang="en-US" smtClean="0"/>
               <a:pPr/>
-              <a:t>2/26/2014</a:t>
+              <a:t>3/19/2014</a:t>
             </a:fld>
             <a:endParaRPr lang="en-US"/>
           </a:p>
@@ -2176,7 +2175,7 @@
             <a:fld id="{3F35B033-0387-4885-861A-442D43D51E29}" type="datetimeFigureOut">
               <a:rPr lang="en-US" smtClean="0"/>
               <a:pPr/>
-              <a:t>2/26/2014</a:t>
+              <a:t>3/19/2014</a:t>
             </a:fld>
             <a:endParaRPr lang="en-US"/>
           </a:p>
@@ -2442,7 +2441,7 @@
             <a:fld id="{3F35B033-0387-4885-861A-442D43D51E29}" type="datetimeFigureOut">
               <a:rPr lang="en-US" smtClean="0"/>
               <a:pPr/>
-              <a:t>2/26/2014</a:t>
+              <a:t>3/19/2014</a:t>
             </a:fld>
             <a:endParaRPr lang="en-US"/>
           </a:p>
@@ -2661,7 +2660,7 @@
             <a:fld id="{3F35B033-0387-4885-861A-442D43D51E29}" type="datetimeFigureOut">
               <a:rPr lang="en-US" smtClean="0"/>
               <a:pPr/>
-              <a:t>2/26/2014</a:t>
+              <a:t>3/19/2014</a:t>
             </a:fld>
             <a:endParaRPr lang="en-US"/>
           </a:p>
@@ -3196,7 +3195,7 @@
         </p:nvSpPr>
         <p:spPr>
           <a:xfrm>
-            <a:off x="0" y="2345625"/>
+            <a:off x="9018152" y="4836363"/>
             <a:ext cx="2690095" cy="1938992"/>
           </a:xfrm>
           <a:prstGeom prst="rect">
@@ -3291,7 +3290,7 @@
           <a:p>
             <a:r>
               <a:rPr lang="en-US" u="sng" dirty="0" smtClean="0"/>
-              <a:t>Evaluate Selected Tools with Small Examples to Analyze Integration/Cohesiveness of Tools:</a:t>
+              <a:t>Begin Drafting Design of Program and GUI</a:t>
             </a:r>
             <a:endParaRPr lang="en-US" dirty="0"/>
           </a:p>
@@ -3306,7 +3305,7 @@
         <p:spPr>
           <a:xfrm>
             <a:off x="595085" y="1785258"/>
-            <a:ext cx="10892413" cy="2215991"/>
+            <a:ext cx="10892413" cy="738664"/>
           </a:xfrm>
           <a:prstGeom prst="rect">
             <a:avLst/>
@@ -3321,16 +3320,9 @@
           <a:p>
             <a:r>
               <a:rPr lang="en-US" sz="2400" dirty="0" smtClean="0"/>
-              <a:t>As far as small examples and code snippets, we currently have working C# code that implements some of the basic classes that GE requires. We have a basic GUI created using Windows Forms with File and Display functionality. We also have a basic code sample in C# that will establish a database connection with a </a:t>
-            </a:r>
-            <a:r>
-              <a:rPr lang="en-US" sz="2400" dirty="0" err="1" smtClean="0"/>
-              <a:t>MySQL</a:t>
-            </a:r>
-            <a:r>
-              <a:rPr lang="en-US" sz="2400" dirty="0" smtClean="0"/>
-              <a:t> database and allow a user to enter queries. </a:t>
-            </a:r>
+              <a:t>   </a:t>
+            </a:r>
+            <a:endParaRPr lang="en-US" sz="2400" dirty="0" smtClean="0"/>
           </a:p>
           <a:p>
             <a:endParaRPr lang="en-US" dirty="0"/>
@@ -3379,19 +3371,36 @@
         </p:nvSpPr>
         <p:spPr/>
         <p:txBody>
-          <a:bodyPr>
-            <a:normAutofit fontScale="90000"/>
-          </a:bodyPr>
-          <a:lstStyle/>
-          <a:p>
-            <a:r>
-              <a:rPr lang="en-US" u="sng" dirty="0" smtClean="0"/>
-              <a:t>Begin Drafting Design of Program and GUI</a:t>
-            </a:r>
-            <a:endParaRPr lang="en-US" dirty="0"/>
-          </a:p>
-        </p:txBody>
-      </p:sp>
+          <a:bodyPr/>
+          <a:lstStyle/>
+          <a:p>
+            <a:endParaRPr lang="en-US"/>
+          </a:p>
+        </p:txBody>
+      </p:sp>
+      <p:pic>
+        <p:nvPicPr>
+          <p:cNvPr id="4" name="Content Placeholder 3" descr="gegreenmachine.jpg"/>
+          <p:cNvPicPr>
+            <a:picLocks noGrp="1" noChangeAspect="1"/>
+          </p:cNvPicPr>
+          <p:nvPr>
+            <p:ph idx="1"/>
+          </p:nvPr>
+        </p:nvPicPr>
+        <p:blipFill>
+          <a:blip r:embed="rId2" cstate="print"/>
+          <a:stretch>
+            <a:fillRect/>
+          </a:stretch>
+        </p:blipFill>
+        <p:spPr>
+          <a:xfrm>
+            <a:off x="0" y="1416"/>
+            <a:ext cx="12192000" cy="6856584"/>
+          </a:xfrm>
+        </p:spPr>
+      </p:pic>
       <p:sp>
         <p:nvSpPr>
           <p:cNvPr id="5" name="TextBox 4"/>
@@ -3400,8 +3409,8 @@
         </p:nvSpPr>
         <p:spPr>
           <a:xfrm>
-            <a:off x="595085" y="1785258"/>
-            <a:ext cx="10892413" cy="1477328"/>
+            <a:off x="6791233" y="190137"/>
+            <a:ext cx="4871847" cy="923330"/>
           </a:xfrm>
           <a:prstGeom prst="rect">
             <a:avLst/>
@@ -3409,25 +3418,31 @@
           <a:noFill/>
         </p:spPr>
         <p:txBody>
-          <a:bodyPr wrap="square" rtlCol="0">
+          <a:bodyPr wrap="none" rtlCol="0">
             <a:spAutoFit/>
           </a:bodyPr>
           <a:lstStyle/>
           <a:p>
             <a:r>
-              <a:rPr lang="en-US" sz="2400" dirty="0" smtClean="0"/>
-              <a:t>With the help of GE professionals, we completed the SDP at the conclusion of our most recent meeting held on 2/14. We also put the finishing touches on both the GUI plan document, created in Photoshop, and the actual coded GUI.  </a:t>
-            </a:r>
-          </a:p>
-          <a:p>
-            <a:endParaRPr lang="en-US" dirty="0"/>
+              <a:rPr lang="en-US" sz="5400" smtClean="0">
+                <a:solidFill>
+                  <a:schemeClr val="bg1"/>
+                </a:solidFill>
+              </a:rPr>
+              <a:t>Next Milestone</a:t>
+            </a:r>
+            <a:endParaRPr lang="en-US" sz="5400" dirty="0">
+              <a:solidFill>
+                <a:schemeClr val="bg1"/>
+              </a:solidFill>
+            </a:endParaRPr>
           </a:p>
         </p:txBody>
       </p:sp>
     </p:spTree>
     <p:extLst>
       <p:ext uri="{BB962C8B-B14F-4D97-AF65-F5344CB8AC3E}">
-        <p14:creationId xmlns:p14="http://schemas.microsoft.com/office/powerpoint/2010/main" val="4270080904"/>
+        <p14:creationId xmlns:p14="http://schemas.microsoft.com/office/powerpoint/2010/main" val="1202250340"/>
       </p:ext>
     </p:extLst>
   </p:cSld>
@@ -3469,77 +3484,51 @@
           <a:bodyPr/>
           <a:lstStyle/>
           <a:p>
-            <a:endParaRPr lang="en-US"/>
-          </a:p>
-        </p:txBody>
-      </p:sp>
-      <p:pic>
-        <p:nvPicPr>
-          <p:cNvPr id="4" name="Content Placeholder 3" descr="gegreenmachine.jpg"/>
-          <p:cNvPicPr>
-            <a:picLocks noGrp="1" noChangeAspect="1"/>
-          </p:cNvPicPr>
+            <a:r>
+              <a:rPr lang="en-US" dirty="0" smtClean="0"/>
+              <a:t>Milestone </a:t>
+            </a:r>
+            <a:r>
+              <a:rPr lang="en-US" dirty="0" smtClean="0"/>
+              <a:t>3</a:t>
+            </a:r>
+            <a:endParaRPr lang="en-US" dirty="0"/>
+          </a:p>
+        </p:txBody>
+      </p:sp>
+      <p:sp>
+        <p:nvSpPr>
+          <p:cNvPr id="3" name="Content Placeholder 2"/>
+          <p:cNvSpPr>
+            <a:spLocks noGrp="1"/>
+          </p:cNvSpPr>
           <p:nvPr>
             <p:ph idx="1"/>
           </p:nvPr>
-        </p:nvPicPr>
-        <p:blipFill>
-          <a:blip r:embed="rId2" cstate="print"/>
-          <a:stretch>
-            <a:fillRect/>
-          </a:stretch>
-        </p:blipFill>
-        <p:spPr>
-          <a:xfrm>
-            <a:off x="0" y="1416"/>
-            <a:ext cx="12192000" cy="6856584"/>
-          </a:xfrm>
-        </p:spPr>
-      </p:pic>
-      <p:sp>
-        <p:nvSpPr>
-          <p:cNvPr id="5" name="TextBox 4"/>
-          <p:cNvSpPr txBox="1"/>
-          <p:nvPr/>
-        </p:nvSpPr>
-        <p:spPr>
-          <a:xfrm>
-            <a:off x="6791233" y="190137"/>
-            <a:ext cx="4871847" cy="923330"/>
-          </a:xfrm>
-          <a:prstGeom prst="rect">
-            <a:avLst/>
-          </a:prstGeom>
-          <a:noFill/>
-        </p:spPr>
-        <p:txBody>
-          <a:bodyPr wrap="none" rtlCol="0">
-            <a:spAutoFit/>
-          </a:bodyPr>
-          <a:lstStyle/>
-          <a:p>
-            <a:r>
-              <a:rPr lang="en-US" sz="5400" smtClean="0">
-                <a:solidFill>
-                  <a:schemeClr val="bg1"/>
-                </a:solidFill>
-              </a:rPr>
-              <a:t>Next Milestone</a:t>
-            </a:r>
-            <a:endParaRPr lang="en-US" sz="5400" dirty="0">
-              <a:solidFill>
-                <a:schemeClr val="bg1"/>
-              </a:solidFill>
-            </a:endParaRPr>
+        </p:nvSpPr>
+        <p:spPr/>
+        <p:txBody>
+          <a:bodyPr/>
+          <a:lstStyle/>
+          <a:p>
+            <a:r>
+              <a:rPr lang="en-US" dirty="0" smtClean="0"/>
+              <a:t> </a:t>
+            </a:r>
+            <a:endParaRPr lang="en-US" dirty="0"/>
+          </a:p>
+          <a:p>
+            <a:pPr marL="137160" lvl="0" indent="0">
+              <a:buNone/>
+            </a:pPr>
+            <a:endParaRPr lang="en-US" dirty="0" smtClean="0"/>
+          </a:p>
+          <a:p>
+            <a:endParaRPr lang="en-US" dirty="0"/>
           </a:p>
         </p:txBody>
       </p:sp>
     </p:spTree>
-    <p:extLst>
-      <p:ext uri="{BB962C8B-B14F-4D97-AF65-F5344CB8AC3E}">
-        <p14:creationId xmlns:p14="http://schemas.microsoft.com/office/powerpoint/2010/main" val="1202250340"/>
-      </p:ext>
-    </p:extLst>
   </p:cSld>
   <p:clrMapOvr>
     <a:masterClrMapping/>
@@ -3574,99 +3563,6 @@
             <p:ph type="title"/>
           </p:nvPr>
         </p:nvSpPr>
-        <p:spPr/>
-        <p:txBody>
-          <a:bodyPr/>
-          <a:lstStyle/>
-          <a:p>
-            <a:r>
-              <a:rPr lang="en-US" dirty="0" smtClean="0"/>
-              <a:t>Milestone 2</a:t>
-            </a:r>
-            <a:endParaRPr lang="en-US" dirty="0"/>
-          </a:p>
-        </p:txBody>
-      </p:sp>
-      <p:sp>
-        <p:nvSpPr>
-          <p:cNvPr id="3" name="Content Placeholder 2"/>
-          <p:cNvSpPr>
-            <a:spLocks noGrp="1"/>
-          </p:cNvSpPr>
-          <p:nvPr>
-            <p:ph idx="1"/>
-          </p:nvPr>
-        </p:nvSpPr>
-        <p:spPr/>
-        <p:txBody>
-          <a:bodyPr/>
-          <a:lstStyle/>
-          <a:p>
-            <a:r>
-              <a:rPr lang="en-US" dirty="0" smtClean="0"/>
-              <a:t>Parsing the database - </a:t>
-            </a:r>
-            <a:r>
-              <a:rPr lang="en-US" dirty="0"/>
-              <a:t>Take our skeleton infrastructure of a database and add to it the functionality of information retrieval. Set it up so that the user can enter query commands and actually retrieve information stored in the database.</a:t>
-            </a:r>
-          </a:p>
-          <a:p>
-            <a:r>
-              <a:rPr lang="en-US" dirty="0" smtClean="0"/>
-              <a:t>Do a GUI mockup and present to GE - </a:t>
-            </a:r>
-            <a:r>
-              <a:rPr lang="en-US" dirty="0"/>
-              <a:t>Take our design documents of our GUI that we created in Photoshop and implement it into C# code. After completing the implementation, we will present it to Dan Ballesty for review and critique.</a:t>
-            </a:r>
-          </a:p>
-          <a:p>
-            <a:pPr marL="137160" lvl="0" indent="0">
-              <a:buNone/>
-            </a:pPr>
-            <a:endParaRPr lang="en-US" dirty="0" smtClean="0"/>
-          </a:p>
-          <a:p>
-            <a:endParaRPr lang="en-US" dirty="0"/>
-          </a:p>
-        </p:txBody>
-      </p:sp>
-    </p:spTree>
-  </p:cSld>
-  <p:clrMapOvr>
-    <a:masterClrMapping/>
-  </p:clrMapOvr>
-</p:sld>
-</file>
-
-<file path=ppt/slides/slide14.xml><?xml version="1.0" encoding="utf-8"?>
-<p:sld xmlns:a="http://schemas.openxmlformats.org/drawingml/2006/main" xmlns:r="http://schemas.openxmlformats.org/officeDocument/2006/relationships" xmlns:p="http://schemas.openxmlformats.org/presentationml/2006/main">
-  <p:cSld>
-    <p:spTree>
-      <p:nvGrpSpPr>
-        <p:cNvPr id="1" name=""/>
-        <p:cNvGrpSpPr/>
-        <p:nvPr/>
-      </p:nvGrpSpPr>
-      <p:grpSpPr>
-        <a:xfrm>
-          <a:off x="0" y="0"/>
-          <a:ext cx="0" cy="0"/>
-          <a:chOff x="0" y="0"/>
-          <a:chExt cx="0" cy="0"/>
-        </a:xfrm>
-      </p:grpSpPr>
-      <p:sp>
-        <p:nvSpPr>
-          <p:cNvPr id="2" name="Title 1"/>
-          <p:cNvSpPr>
-            <a:spLocks noGrp="1"/>
-          </p:cNvSpPr>
-          <p:nvPr>
-            <p:ph type="title"/>
-          </p:nvPr>
-        </p:nvSpPr>
         <p:spPr>
           <a:xfrm>
             <a:off x="1619794" y="0"/>
@@ -3697,7 +3593,7 @@
             <p:ph idx="1"/>
             <p:extLst>
               <p:ext uri="{D42A27DB-BD31-4B8C-83A1-F6EECF244321}">
-                <p14:modId xmlns:p14="http://schemas.microsoft.com/office/powerpoint/2010/main" val="761006259"/>
+                <p14:modId xmlns:p14="http://schemas.microsoft.com/office/powerpoint/2010/main" val="3271794229"/>
               </p:ext>
             </p:extLst>
           </p:nvPr>
@@ -3823,18 +3719,7 @@
                           <a:ea typeface="+mn-ea"/>
                           <a:cs typeface="+mn-cs"/>
                         </a:rPr>
-                        <a:t>Parsing the</a:t>
-                      </a:r>
-                      <a:r>
-                        <a:rPr kumimoji="0" lang="en-US" sz="1400" kern="1200" baseline="0" dirty="0" smtClean="0">
-                          <a:solidFill>
-                            <a:schemeClr val="dk1"/>
-                          </a:solidFill>
-                          <a:latin typeface="+mn-lt"/>
-                          <a:ea typeface="+mn-ea"/>
-                          <a:cs typeface="+mn-cs"/>
-                        </a:rPr>
-                        <a:t> Database information</a:t>
+                        <a:t> </a:t>
                       </a:r>
                       <a:endParaRPr kumimoji="0" lang="en-US" sz="1400" kern="1200" dirty="0" smtClean="0">
                         <a:solidFill>
@@ -3859,7 +3744,7 @@
                       <a:pPr algn="ctr"/>
                       <a:r>
                         <a:rPr lang="en-US" dirty="0" smtClean="0"/>
-                        <a:t>0%</a:t>
+                        <a:t> </a:t>
                       </a:r>
                       <a:endParaRPr lang="en-US" dirty="0"/>
                     </a:p>
@@ -3890,8 +3775,9 @@
                       </a:pPr>
                       <a:r>
                         <a:rPr lang="en-US" dirty="0" smtClean="0"/>
-                        <a:t>100%</a:t>
+                        <a:t> </a:t>
                       </a:r>
+                      <a:endParaRPr lang="en-US" dirty="0" smtClean="0"/>
                     </a:p>
                     <a:p>
                       <a:pPr algn="ctr"/>
@@ -3924,8 +3810,9 @@
                       </a:pPr>
                       <a:r>
                         <a:rPr lang="en-US" dirty="0" smtClean="0"/>
-                        <a:t>100%</a:t>
+                        <a:t> </a:t>
                       </a:r>
+                      <a:endParaRPr lang="en-US" dirty="0" smtClean="0"/>
                     </a:p>
                     <a:p>
                       <a:pPr algn="ctr"/>
@@ -3958,8 +3845,9 @@
                       </a:pPr>
                       <a:r>
                         <a:rPr lang="en-US" dirty="0" smtClean="0"/>
-                        <a:t>0%</a:t>
+                        <a:t> </a:t>
                       </a:r>
+                      <a:endParaRPr lang="en-US" dirty="0" smtClean="0"/>
                     </a:p>
                     <a:p>
                       <a:pPr algn="ctr"/>
@@ -4001,18 +3889,7 @@
                           <a:ea typeface="+mn-ea"/>
                           <a:cs typeface="+mn-cs"/>
                         </a:rPr>
-                        <a:t>Do a GUI Mockup and</a:t>
-                      </a:r>
-                      <a:r>
-                        <a:rPr kumimoji="0" lang="en-US" sz="1400" kern="1200" baseline="0" dirty="0" smtClean="0">
-                          <a:solidFill>
-                            <a:schemeClr val="dk1"/>
-                          </a:solidFill>
-                          <a:latin typeface="+mn-lt"/>
-                          <a:ea typeface="+mn-ea"/>
-                          <a:cs typeface="+mn-cs"/>
-                        </a:rPr>
-                        <a:t> present to GE</a:t>
+                        <a:t> </a:t>
                       </a:r>
                       <a:endParaRPr kumimoji="0" lang="en-US" sz="1400" kern="1200" dirty="0" smtClean="0">
                         <a:solidFill>
@@ -4053,8 +3930,40 @@
                       </a:pPr>
                       <a:r>
                         <a:rPr lang="en-US" dirty="0" smtClean="0"/>
-                        <a:t>100%</a:t>
+                        <a:t> </a:t>
                       </a:r>
+                      <a:endParaRPr lang="en-US" dirty="0"/>
+                    </a:p>
+                  </a:txBody>
+                  <a:tcPr/>
+                </a:tc>
+                <a:tc>
+                  <a:txBody>
+                    <a:bodyPr/>
+                    <a:lstStyle/>
+                    <a:p>
+                      <a:pPr marL="0" marR="0" indent="0" algn="ctr" defTabSz="914400" rtl="0" eaLnBrk="1" fontAlgn="auto" latinLnBrk="0" hangingPunct="1">
+                        <a:lnSpc>
+                          <a:spcPct val="100000"/>
+                        </a:lnSpc>
+                        <a:spcBef>
+                          <a:spcPts val="0"/>
+                        </a:spcBef>
+                        <a:spcAft>
+                          <a:spcPts val="0"/>
+                        </a:spcAft>
+                        <a:buClrTx/>
+                        <a:buSzTx/>
+                        <a:buFontTx/>
+                        <a:buNone/>
+                        <a:tabLst/>
+                        <a:defRPr/>
+                      </a:pPr>
+                      <a:r>
+                        <a:rPr lang="en-US" dirty="0" smtClean="0"/>
+                        <a:t> </a:t>
+                      </a:r>
+                      <a:endParaRPr lang="en-US" dirty="0" smtClean="0"/>
                     </a:p>
                     <a:p>
                       <a:pPr algn="ctr"/>
@@ -4087,8 +3996,9 @@
                       </a:pPr>
                       <a:r>
                         <a:rPr lang="en-US" dirty="0" smtClean="0"/>
-                        <a:t>0%</a:t>
+                        <a:t> </a:t>
                       </a:r>
+                      <a:endParaRPr lang="en-US" dirty="0" smtClean="0"/>
                     </a:p>
                     <a:p>
                       <a:pPr algn="ctr"/>
@@ -4121,42 +4031,9 @@
                       </a:pPr>
                       <a:r>
                         <a:rPr lang="en-US" dirty="0" smtClean="0"/>
-                        <a:t>0%</a:t>
+                        <a:t> </a:t>
                       </a:r>
-                    </a:p>
-                    <a:p>
-                      <a:pPr algn="ctr"/>
-                      <a:endParaRPr lang="en-US" dirty="0"/>
-                    </a:p>
-                  </a:txBody>
-                  <a:tcPr/>
-                </a:tc>
-                <a:tc>
-                  <a:txBody>
-                    <a:bodyPr/>
-                    <a:lstStyle/>
-                    <a:p>
-                      <a:pPr marL="0" marR="0" indent="0" algn="ctr" defTabSz="914400" rtl="0" eaLnBrk="1" fontAlgn="auto" latinLnBrk="0" hangingPunct="1">
-                        <a:lnSpc>
-                          <a:spcPct val="100000"/>
-                        </a:lnSpc>
-                        <a:spcBef>
-                          <a:spcPts val="0"/>
-                        </a:spcBef>
-                        <a:spcAft>
-                          <a:spcPts val="0"/>
-                        </a:spcAft>
-                        <a:buClrTx/>
-                        <a:buSzTx/>
-                        <a:buFontTx/>
-                        <a:buNone/>
-                        <a:tabLst/>
-                        <a:defRPr/>
-                      </a:pPr>
-                      <a:r>
-                        <a:rPr lang="en-US" dirty="0" smtClean="0"/>
-                        <a:t>100%</a:t>
-                      </a:r>
+                      <a:endParaRPr lang="en-US" dirty="0" smtClean="0"/>
                     </a:p>
                     <a:p>
                       <a:pPr algn="ctr"/>
@@ -4178,7 +4055,7 @@
 </p:sld>
 </file>
 
-<file path=ppt/slides/slide15.xml><?xml version="1.0" encoding="utf-8"?>
+<file path=ppt/slides/slide14.xml><?xml version="1.0" encoding="utf-8"?>
 <p:sld xmlns:a="http://schemas.openxmlformats.org/drawingml/2006/main" xmlns:r="http://schemas.openxmlformats.org/officeDocument/2006/relationships" xmlns:p="http://schemas.openxmlformats.org/presentationml/2006/main">
   <p:cSld>
     <p:spTree>
@@ -4314,788 +4191,7 @@
             <p:ph idx="1"/>
             <p:extLst>
               <p:ext uri="{D42A27DB-BD31-4B8C-83A1-F6EECF244321}">
-                <p14:modId xmlns:p14="http://schemas.microsoft.com/office/powerpoint/2010/main" val="606066215"/>
-              </p:ext>
-            </p:extLst>
-          </p:nvPr>
-        </p:nvGraphicFramePr>
-        <p:xfrm>
-          <a:off x="1103086" y="1417638"/>
-          <a:ext cx="10116456" cy="4634819"/>
-        </p:xfrm>
-        <a:graphic>
-          <a:graphicData uri="http://schemas.openxmlformats.org/drawingml/2006/table">
-            <a:tbl>
-              <a:tblPr firstRow="1" firstCol="1" bandRow="1">
-                <a:tableStyleId>{5C22544A-7EE6-4342-B048-85BDC9FD1C3A}</a:tableStyleId>
-              </a:tblPr>
-              <a:tblGrid>
-                <a:gridCol w="1445208"/>
-                <a:gridCol w="1445208"/>
-                <a:gridCol w="1445208"/>
-                <a:gridCol w="1445208"/>
-                <a:gridCol w="1445208"/>
-                <a:gridCol w="1445208"/>
-                <a:gridCol w="1445208"/>
-              </a:tblGrid>
-              <a:tr h="905983">
-                <a:tc>
-                  <a:txBody>
-                    <a:bodyPr/>
-                    <a:lstStyle/>
-                    <a:p>
-                      <a:pPr marL="0" marR="0" algn="ctr">
-                        <a:lnSpc>
-                          <a:spcPct val="115000"/>
-                        </a:lnSpc>
-                        <a:spcBef>
-                          <a:spcPts val="0"/>
-                        </a:spcBef>
-                        <a:spcAft>
-                          <a:spcPts val="0"/>
-                        </a:spcAft>
-                      </a:pPr>
-                      <a:r>
-                        <a:rPr lang="en-US" sz="1400" dirty="0">
-                          <a:effectLst/>
-                        </a:rPr>
-                        <a:t>Task</a:t>
-                      </a:r>
-                      <a:endParaRPr lang="en-US" sz="1400" dirty="0">
-                        <a:effectLst/>
-                        <a:latin typeface="Calibri" panose="020F0502020204030204" pitchFamily="34" charset="0"/>
-                        <a:ea typeface="Calibri" panose="020F0502020204030204" pitchFamily="34" charset="0"/>
-                        <a:cs typeface="Times New Roman" panose="02020603050405020304" pitchFamily="18" charset="0"/>
-                      </a:endParaRPr>
-                    </a:p>
-                  </a:txBody>
-                  <a:tcPr marL="68580" marR="68580" marT="0" marB="0"/>
-                </a:tc>
-                <a:tc>
-                  <a:txBody>
-                    <a:bodyPr/>
-                    <a:lstStyle/>
-                    <a:p>
-                      <a:pPr marL="0" marR="0" algn="ctr">
-                        <a:lnSpc>
-                          <a:spcPct val="115000"/>
-                        </a:lnSpc>
-                        <a:spcBef>
-                          <a:spcPts val="0"/>
-                        </a:spcBef>
-                        <a:spcAft>
-                          <a:spcPts val="0"/>
-                        </a:spcAft>
-                      </a:pPr>
-                      <a:r>
-                        <a:rPr lang="en-US" sz="1400" dirty="0">
-                          <a:effectLst/>
-                        </a:rPr>
-                        <a:t>Completion %</a:t>
-                      </a:r>
-                      <a:endParaRPr lang="en-US" sz="1400" dirty="0">
-                        <a:effectLst/>
-                        <a:latin typeface="Calibri" panose="020F0502020204030204" pitchFamily="34" charset="0"/>
-                        <a:ea typeface="Calibri" panose="020F0502020204030204" pitchFamily="34" charset="0"/>
-                        <a:cs typeface="Times New Roman" panose="02020603050405020304" pitchFamily="18" charset="0"/>
-                      </a:endParaRPr>
-                    </a:p>
-                  </a:txBody>
-                  <a:tcPr marL="68580" marR="68580" marT="0" marB="0"/>
-                </a:tc>
-                <a:tc>
-                  <a:txBody>
-                    <a:bodyPr/>
-                    <a:lstStyle/>
-                    <a:p>
-                      <a:pPr marL="0" marR="0" algn="ctr">
-                        <a:lnSpc>
-                          <a:spcPct val="115000"/>
-                        </a:lnSpc>
-                        <a:spcBef>
-                          <a:spcPts val="0"/>
-                        </a:spcBef>
-                        <a:spcAft>
-                          <a:spcPts val="0"/>
-                        </a:spcAft>
-                      </a:pPr>
-                      <a:r>
-                        <a:rPr lang="en-US" sz="1400" dirty="0">
-                          <a:effectLst/>
-                        </a:rPr>
-                        <a:t>Kenneth Truex</a:t>
-                      </a:r>
-                      <a:endParaRPr lang="en-US" sz="1400" dirty="0">
-                        <a:effectLst/>
-                        <a:latin typeface="Calibri" panose="020F0502020204030204" pitchFamily="34" charset="0"/>
-                        <a:ea typeface="Calibri" panose="020F0502020204030204" pitchFamily="34" charset="0"/>
-                        <a:cs typeface="Times New Roman" panose="02020603050405020304" pitchFamily="18" charset="0"/>
-                      </a:endParaRPr>
-                    </a:p>
-                  </a:txBody>
-                  <a:tcPr marL="68580" marR="68580" marT="0" marB="0"/>
-                </a:tc>
-                <a:tc>
-                  <a:txBody>
-                    <a:bodyPr/>
-                    <a:lstStyle/>
-                    <a:p>
-                      <a:pPr marL="0" marR="0" algn="ctr">
-                        <a:lnSpc>
-                          <a:spcPct val="115000"/>
-                        </a:lnSpc>
-                        <a:spcBef>
-                          <a:spcPts val="0"/>
-                        </a:spcBef>
-                        <a:spcAft>
-                          <a:spcPts val="0"/>
-                        </a:spcAft>
-                      </a:pPr>
-                      <a:r>
-                        <a:rPr lang="en-US" sz="1400" dirty="0">
-                          <a:effectLst/>
-                        </a:rPr>
-                        <a:t>Christopher Diebold</a:t>
-                      </a:r>
-                      <a:endParaRPr lang="en-US" sz="1400" dirty="0">
-                        <a:effectLst/>
-                        <a:latin typeface="Calibri" panose="020F0502020204030204" pitchFamily="34" charset="0"/>
-                        <a:ea typeface="Calibri" panose="020F0502020204030204" pitchFamily="34" charset="0"/>
-                        <a:cs typeface="Times New Roman" panose="02020603050405020304" pitchFamily="18" charset="0"/>
-                      </a:endParaRPr>
-                    </a:p>
-                  </a:txBody>
-                  <a:tcPr marL="68580" marR="68580" marT="0" marB="0"/>
-                </a:tc>
-                <a:tc>
-                  <a:txBody>
-                    <a:bodyPr/>
-                    <a:lstStyle/>
-                    <a:p>
-                      <a:pPr marL="0" marR="0" algn="ctr">
-                        <a:lnSpc>
-                          <a:spcPct val="115000"/>
-                        </a:lnSpc>
-                        <a:spcBef>
-                          <a:spcPts val="0"/>
-                        </a:spcBef>
-                        <a:spcAft>
-                          <a:spcPts val="0"/>
-                        </a:spcAft>
-                      </a:pPr>
-                      <a:r>
-                        <a:rPr lang="en-US" sz="1400" dirty="0">
-                          <a:effectLst/>
-                        </a:rPr>
-                        <a:t>Chad Mason</a:t>
-                      </a:r>
-                      <a:endParaRPr lang="en-US" sz="1400" dirty="0">
-                        <a:effectLst/>
-                        <a:latin typeface="Calibri" panose="020F0502020204030204" pitchFamily="34" charset="0"/>
-                        <a:ea typeface="Calibri" panose="020F0502020204030204" pitchFamily="34" charset="0"/>
-                        <a:cs typeface="Times New Roman" panose="02020603050405020304" pitchFamily="18" charset="0"/>
-                      </a:endParaRPr>
-                    </a:p>
-                  </a:txBody>
-                  <a:tcPr marL="68580" marR="68580" marT="0" marB="0"/>
-                </a:tc>
-                <a:tc>
-                  <a:txBody>
-                    <a:bodyPr/>
-                    <a:lstStyle/>
-                    <a:p>
-                      <a:pPr marL="0" marR="0" algn="ctr">
-                        <a:lnSpc>
-                          <a:spcPct val="115000"/>
-                        </a:lnSpc>
-                        <a:spcBef>
-                          <a:spcPts val="0"/>
-                        </a:spcBef>
-                        <a:spcAft>
-                          <a:spcPts val="0"/>
-                        </a:spcAft>
-                      </a:pPr>
-                      <a:r>
-                        <a:rPr lang="en-US" sz="1400">
-                          <a:effectLst/>
-                        </a:rPr>
-                        <a:t>Zachary McHenry</a:t>
-                      </a:r>
-                      <a:endParaRPr lang="en-US" sz="1400">
-                        <a:effectLst/>
-                        <a:latin typeface="Calibri" panose="020F0502020204030204" pitchFamily="34" charset="0"/>
-                        <a:ea typeface="Calibri" panose="020F0502020204030204" pitchFamily="34" charset="0"/>
-                        <a:cs typeface="Times New Roman" panose="02020603050405020304" pitchFamily="18" charset="0"/>
-                      </a:endParaRPr>
-                    </a:p>
-                  </a:txBody>
-                  <a:tcPr marL="68580" marR="68580" marT="0" marB="0"/>
-                </a:tc>
-                <a:tc>
-                  <a:txBody>
-                    <a:bodyPr/>
-                    <a:lstStyle/>
-                    <a:p>
-                      <a:pPr marL="0" marR="0" algn="ctr">
-                        <a:lnSpc>
-                          <a:spcPct val="115000"/>
-                        </a:lnSpc>
-                        <a:spcBef>
-                          <a:spcPts val="0"/>
-                        </a:spcBef>
-                        <a:spcAft>
-                          <a:spcPts val="0"/>
-                        </a:spcAft>
-                      </a:pPr>
-                      <a:r>
-                        <a:rPr lang="en-US" sz="1400" dirty="0">
-                          <a:effectLst/>
-                        </a:rPr>
-                        <a:t>To Do</a:t>
-                      </a:r>
-                      <a:endParaRPr lang="en-US" sz="1400" dirty="0">
-                        <a:effectLst/>
-                        <a:latin typeface="Calibri" panose="020F0502020204030204" pitchFamily="34" charset="0"/>
-                        <a:ea typeface="Calibri" panose="020F0502020204030204" pitchFamily="34" charset="0"/>
-                        <a:cs typeface="Times New Roman" panose="02020603050405020304" pitchFamily="18" charset="0"/>
-                      </a:endParaRPr>
-                    </a:p>
-                  </a:txBody>
-                  <a:tcPr marL="68580" marR="68580" marT="0" marB="0"/>
-                </a:tc>
-              </a:tr>
-              <a:tr h="2084401">
-                <a:tc>
-                  <a:txBody>
-                    <a:bodyPr/>
-                    <a:lstStyle/>
-                    <a:p>
-                      <a:pPr marL="0" marR="0" algn="ctr">
-                        <a:lnSpc>
-                          <a:spcPct val="115000"/>
-                        </a:lnSpc>
-                        <a:spcBef>
-                          <a:spcPts val="0"/>
-                        </a:spcBef>
-                        <a:spcAft>
-                          <a:spcPts val="0"/>
-                        </a:spcAft>
-                      </a:pPr>
-                      <a:r>
-                        <a:rPr lang="en-US" sz="1400" dirty="0">
-                          <a:effectLst/>
-                        </a:rPr>
-                        <a:t>Obtain Requirement Document From GE</a:t>
-                      </a:r>
-                      <a:endParaRPr lang="en-US" sz="1400" dirty="0">
-                        <a:effectLst/>
-                        <a:latin typeface="Calibri" panose="020F0502020204030204" pitchFamily="34" charset="0"/>
-                        <a:ea typeface="Calibri" panose="020F0502020204030204" pitchFamily="34" charset="0"/>
-                        <a:cs typeface="Times New Roman" panose="02020603050405020304" pitchFamily="18" charset="0"/>
-                      </a:endParaRPr>
-                    </a:p>
-                  </a:txBody>
-                  <a:tcPr marL="68580" marR="68580" marT="0" marB="0"/>
-                </a:tc>
-                <a:tc>
-                  <a:txBody>
-                    <a:bodyPr/>
-                    <a:lstStyle/>
-                    <a:p>
-                      <a:pPr marL="0" marR="0" algn="ctr">
-                        <a:lnSpc>
-                          <a:spcPct val="115000"/>
-                        </a:lnSpc>
-                        <a:spcBef>
-                          <a:spcPts val="0"/>
-                        </a:spcBef>
-                        <a:spcAft>
-                          <a:spcPts val="0"/>
-                        </a:spcAft>
-                      </a:pPr>
-                      <a:r>
-                        <a:rPr lang="en-US" sz="1400">
-                          <a:effectLst/>
-                        </a:rPr>
-                        <a:t>100%</a:t>
-                      </a:r>
-                      <a:endParaRPr lang="en-US" sz="1400">
-                        <a:effectLst/>
-                        <a:latin typeface="Calibri" panose="020F0502020204030204" pitchFamily="34" charset="0"/>
-                        <a:ea typeface="Calibri" panose="020F0502020204030204" pitchFamily="34" charset="0"/>
-                        <a:cs typeface="Times New Roman" panose="02020603050405020304" pitchFamily="18" charset="0"/>
-                      </a:endParaRPr>
-                    </a:p>
-                  </a:txBody>
-                  <a:tcPr marL="68580" marR="68580" marT="0" marB="0"/>
-                </a:tc>
-                <a:tc>
-                  <a:txBody>
-                    <a:bodyPr/>
-                    <a:lstStyle/>
-                    <a:p>
-                      <a:pPr marL="0" marR="0" algn="ctr">
-                        <a:lnSpc>
-                          <a:spcPct val="115000"/>
-                        </a:lnSpc>
-                        <a:spcBef>
-                          <a:spcPts val="0"/>
-                        </a:spcBef>
-                        <a:spcAft>
-                          <a:spcPts val="0"/>
-                        </a:spcAft>
-                      </a:pPr>
-                      <a:r>
-                        <a:rPr lang="en-US" sz="1400" dirty="0">
-                          <a:effectLst/>
-                        </a:rPr>
-                        <a:t>50%</a:t>
-                      </a:r>
-                      <a:endParaRPr lang="en-US" sz="1400" dirty="0">
-                        <a:effectLst/>
-                        <a:latin typeface="Calibri" panose="020F0502020204030204" pitchFamily="34" charset="0"/>
-                        <a:ea typeface="Calibri" panose="020F0502020204030204" pitchFamily="34" charset="0"/>
-                        <a:cs typeface="Times New Roman" panose="02020603050405020304" pitchFamily="18" charset="0"/>
-                      </a:endParaRPr>
-                    </a:p>
-                  </a:txBody>
-                  <a:tcPr marL="68580" marR="68580" marT="0" marB="0"/>
-                </a:tc>
-                <a:tc>
-                  <a:txBody>
-                    <a:bodyPr/>
-                    <a:lstStyle/>
-                    <a:p>
-                      <a:pPr marL="0" marR="0" algn="ctr">
-                        <a:lnSpc>
-                          <a:spcPct val="115000"/>
-                        </a:lnSpc>
-                        <a:spcBef>
-                          <a:spcPts val="0"/>
-                        </a:spcBef>
-                        <a:spcAft>
-                          <a:spcPts val="0"/>
-                        </a:spcAft>
-                      </a:pPr>
-                      <a:r>
-                        <a:rPr lang="en-US" sz="1400" dirty="0">
-                          <a:effectLst/>
-                        </a:rPr>
-                        <a:t>50%</a:t>
-                      </a:r>
-                      <a:endParaRPr lang="en-US" sz="1400" dirty="0">
-                        <a:effectLst/>
-                        <a:latin typeface="Calibri" panose="020F0502020204030204" pitchFamily="34" charset="0"/>
-                        <a:ea typeface="Calibri" panose="020F0502020204030204" pitchFamily="34" charset="0"/>
-                        <a:cs typeface="Times New Roman" panose="02020603050405020304" pitchFamily="18" charset="0"/>
-                      </a:endParaRPr>
-                    </a:p>
-                  </a:txBody>
-                  <a:tcPr marL="68580" marR="68580" marT="0" marB="0"/>
-                </a:tc>
-                <a:tc>
-                  <a:txBody>
-                    <a:bodyPr/>
-                    <a:lstStyle/>
-                    <a:p>
-                      <a:pPr marL="0" marR="0" algn="ctr">
-                        <a:lnSpc>
-                          <a:spcPct val="115000"/>
-                        </a:lnSpc>
-                        <a:spcBef>
-                          <a:spcPts val="0"/>
-                        </a:spcBef>
-                        <a:spcAft>
-                          <a:spcPts val="0"/>
-                        </a:spcAft>
-                      </a:pPr>
-                      <a:r>
-                        <a:rPr lang="en-US" sz="1400">
-                          <a:effectLst/>
-                        </a:rPr>
-                        <a:t>0%</a:t>
-                      </a:r>
-                      <a:endParaRPr lang="en-US" sz="1400">
-                        <a:effectLst/>
-                        <a:latin typeface="Calibri" panose="020F0502020204030204" pitchFamily="34" charset="0"/>
-                        <a:ea typeface="Calibri" panose="020F0502020204030204" pitchFamily="34" charset="0"/>
-                        <a:cs typeface="Times New Roman" panose="02020603050405020304" pitchFamily="18" charset="0"/>
-                      </a:endParaRPr>
-                    </a:p>
-                  </a:txBody>
-                  <a:tcPr marL="68580" marR="68580" marT="0" marB="0"/>
-                </a:tc>
-                <a:tc>
-                  <a:txBody>
-                    <a:bodyPr/>
-                    <a:lstStyle/>
-                    <a:p>
-                      <a:pPr marL="0" marR="0" algn="ctr">
-                        <a:lnSpc>
-                          <a:spcPct val="115000"/>
-                        </a:lnSpc>
-                        <a:spcBef>
-                          <a:spcPts val="0"/>
-                        </a:spcBef>
-                        <a:spcAft>
-                          <a:spcPts val="0"/>
-                        </a:spcAft>
-                      </a:pPr>
-                      <a:r>
-                        <a:rPr lang="en-US" sz="1400" dirty="0">
-                          <a:effectLst/>
-                        </a:rPr>
-                        <a:t>0%</a:t>
-                      </a:r>
-                      <a:endParaRPr lang="en-US" sz="1400" dirty="0">
-                        <a:effectLst/>
-                        <a:latin typeface="Calibri" panose="020F0502020204030204" pitchFamily="34" charset="0"/>
-                        <a:ea typeface="Calibri" panose="020F0502020204030204" pitchFamily="34" charset="0"/>
-                        <a:cs typeface="Times New Roman" panose="02020603050405020304" pitchFamily="18" charset="0"/>
-                      </a:endParaRPr>
-                    </a:p>
-                  </a:txBody>
-                  <a:tcPr marL="68580" marR="68580" marT="0" marB="0"/>
-                </a:tc>
-                <a:tc>
-                  <a:txBody>
-                    <a:bodyPr/>
-                    <a:lstStyle/>
-                    <a:p>
-                      <a:pPr marL="0" marR="0" algn="ctr">
-                        <a:lnSpc>
-                          <a:spcPct val="115000"/>
-                        </a:lnSpc>
-                        <a:spcBef>
-                          <a:spcPts val="0"/>
-                        </a:spcBef>
-                        <a:spcAft>
-                          <a:spcPts val="0"/>
-                        </a:spcAft>
-                      </a:pPr>
-                      <a:r>
-                        <a:rPr lang="en-US" sz="1400" dirty="0">
-                          <a:effectLst/>
-                        </a:rPr>
-                        <a:t>Ensure a full understanding of the “</a:t>
-                      </a:r>
-                      <a:r>
-                        <a:rPr lang="en-US" sz="1400" dirty="0" err="1">
-                          <a:effectLst/>
-                        </a:rPr>
-                        <a:t>Shalls</a:t>
-                      </a:r>
-                      <a:r>
-                        <a:rPr lang="en-US" sz="1400" dirty="0">
-                          <a:effectLst/>
-                        </a:rPr>
-                        <a:t>” associated with this project</a:t>
-                      </a:r>
-                      <a:endParaRPr lang="en-US" sz="1400" dirty="0">
-                        <a:effectLst/>
-                        <a:latin typeface="Calibri" panose="020F0502020204030204" pitchFamily="34" charset="0"/>
-                        <a:ea typeface="Calibri" panose="020F0502020204030204" pitchFamily="34" charset="0"/>
-                        <a:cs typeface="Times New Roman" panose="02020603050405020304" pitchFamily="18" charset="0"/>
-                      </a:endParaRPr>
-                    </a:p>
-                  </a:txBody>
-                  <a:tcPr marL="68580" marR="68580" marT="0" marB="0"/>
-                </a:tc>
-              </a:tr>
-              <a:tr h="1644435">
-                <a:tc>
-                  <a:txBody>
-                    <a:bodyPr/>
-                    <a:lstStyle/>
-                    <a:p>
-                      <a:pPr marL="0" marR="0" algn="ctr">
-                        <a:lnSpc>
-                          <a:spcPct val="115000"/>
-                        </a:lnSpc>
-                        <a:spcBef>
-                          <a:spcPts val="0"/>
-                        </a:spcBef>
-                        <a:spcAft>
-                          <a:spcPts val="0"/>
-                        </a:spcAft>
-                      </a:pPr>
-                      <a:r>
-                        <a:rPr lang="en-US" sz="1400" dirty="0">
-                          <a:effectLst/>
-                        </a:rPr>
-                        <a:t>Decide on IDE/Programming Language/Database Tools</a:t>
-                      </a:r>
-                      <a:endParaRPr lang="en-US" sz="1400" dirty="0">
-                        <a:effectLst/>
-                        <a:latin typeface="Calibri" panose="020F0502020204030204" pitchFamily="34" charset="0"/>
-                        <a:ea typeface="Calibri" panose="020F0502020204030204" pitchFamily="34" charset="0"/>
-                        <a:cs typeface="Times New Roman" panose="02020603050405020304" pitchFamily="18" charset="0"/>
-                      </a:endParaRPr>
-                    </a:p>
-                  </a:txBody>
-                  <a:tcPr marL="68580" marR="68580" marT="0" marB="0"/>
-                </a:tc>
-                <a:tc>
-                  <a:txBody>
-                    <a:bodyPr/>
-                    <a:lstStyle/>
-                    <a:p>
-                      <a:pPr marL="0" marR="0" algn="ctr">
-                        <a:lnSpc>
-                          <a:spcPct val="115000"/>
-                        </a:lnSpc>
-                        <a:spcBef>
-                          <a:spcPts val="0"/>
-                        </a:spcBef>
-                        <a:spcAft>
-                          <a:spcPts val="0"/>
-                        </a:spcAft>
-                      </a:pPr>
-                      <a:r>
-                        <a:rPr lang="en-US" sz="1400">
-                          <a:effectLst/>
-                        </a:rPr>
-                        <a:t>100%</a:t>
-                      </a:r>
-                      <a:endParaRPr lang="en-US" sz="1400">
-                        <a:effectLst/>
-                        <a:latin typeface="Calibri" panose="020F0502020204030204" pitchFamily="34" charset="0"/>
-                        <a:ea typeface="Calibri" panose="020F0502020204030204" pitchFamily="34" charset="0"/>
-                        <a:cs typeface="Times New Roman" panose="02020603050405020304" pitchFamily="18" charset="0"/>
-                      </a:endParaRPr>
-                    </a:p>
-                  </a:txBody>
-                  <a:tcPr marL="68580" marR="68580" marT="0" marB="0"/>
-                </a:tc>
-                <a:tc>
-                  <a:txBody>
-                    <a:bodyPr/>
-                    <a:lstStyle/>
-                    <a:p>
-                      <a:pPr marL="0" marR="0" algn="ctr">
-                        <a:lnSpc>
-                          <a:spcPct val="115000"/>
-                        </a:lnSpc>
-                        <a:spcBef>
-                          <a:spcPts val="0"/>
-                        </a:spcBef>
-                        <a:spcAft>
-                          <a:spcPts val="0"/>
-                        </a:spcAft>
-                      </a:pPr>
-                      <a:r>
-                        <a:rPr lang="en-US" sz="1400">
-                          <a:effectLst/>
-                        </a:rPr>
-                        <a:t>25%</a:t>
-                      </a:r>
-                      <a:endParaRPr lang="en-US" sz="1400">
-                        <a:effectLst/>
-                        <a:latin typeface="Calibri" panose="020F0502020204030204" pitchFamily="34" charset="0"/>
-                        <a:ea typeface="Calibri" panose="020F0502020204030204" pitchFamily="34" charset="0"/>
-                        <a:cs typeface="Times New Roman" panose="02020603050405020304" pitchFamily="18" charset="0"/>
-                      </a:endParaRPr>
-                    </a:p>
-                  </a:txBody>
-                  <a:tcPr marL="68580" marR="68580" marT="0" marB="0"/>
-                </a:tc>
-                <a:tc>
-                  <a:txBody>
-                    <a:bodyPr/>
-                    <a:lstStyle/>
-                    <a:p>
-                      <a:pPr marL="0" marR="0" algn="ctr">
-                        <a:lnSpc>
-                          <a:spcPct val="115000"/>
-                        </a:lnSpc>
-                        <a:spcBef>
-                          <a:spcPts val="0"/>
-                        </a:spcBef>
-                        <a:spcAft>
-                          <a:spcPts val="0"/>
-                        </a:spcAft>
-                      </a:pPr>
-                      <a:r>
-                        <a:rPr lang="en-US" sz="1400">
-                          <a:effectLst/>
-                        </a:rPr>
-                        <a:t>25%</a:t>
-                      </a:r>
-                      <a:endParaRPr lang="en-US" sz="1400">
-                        <a:effectLst/>
-                        <a:latin typeface="Calibri" panose="020F0502020204030204" pitchFamily="34" charset="0"/>
-                        <a:ea typeface="Calibri" panose="020F0502020204030204" pitchFamily="34" charset="0"/>
-                        <a:cs typeface="Times New Roman" panose="02020603050405020304" pitchFamily="18" charset="0"/>
-                      </a:endParaRPr>
-                    </a:p>
-                  </a:txBody>
-                  <a:tcPr marL="68580" marR="68580" marT="0" marB="0"/>
-                </a:tc>
-                <a:tc>
-                  <a:txBody>
-                    <a:bodyPr/>
-                    <a:lstStyle/>
-                    <a:p>
-                      <a:pPr marL="0" marR="0" algn="ctr">
-                        <a:lnSpc>
-                          <a:spcPct val="115000"/>
-                        </a:lnSpc>
-                        <a:spcBef>
-                          <a:spcPts val="0"/>
-                        </a:spcBef>
-                        <a:spcAft>
-                          <a:spcPts val="0"/>
-                        </a:spcAft>
-                      </a:pPr>
-                      <a:r>
-                        <a:rPr lang="en-US" sz="1400">
-                          <a:effectLst/>
-                        </a:rPr>
-                        <a:t>25%</a:t>
-                      </a:r>
-                      <a:endParaRPr lang="en-US" sz="1400">
-                        <a:effectLst/>
-                        <a:latin typeface="Calibri" panose="020F0502020204030204" pitchFamily="34" charset="0"/>
-                        <a:ea typeface="Calibri" panose="020F0502020204030204" pitchFamily="34" charset="0"/>
-                        <a:cs typeface="Times New Roman" panose="02020603050405020304" pitchFamily="18" charset="0"/>
-                      </a:endParaRPr>
-                    </a:p>
-                  </a:txBody>
-                  <a:tcPr marL="68580" marR="68580" marT="0" marB="0"/>
-                </a:tc>
-                <a:tc>
-                  <a:txBody>
-                    <a:bodyPr/>
-                    <a:lstStyle/>
-                    <a:p>
-                      <a:pPr marL="0" marR="0" algn="ctr">
-                        <a:lnSpc>
-                          <a:spcPct val="115000"/>
-                        </a:lnSpc>
-                        <a:spcBef>
-                          <a:spcPts val="0"/>
-                        </a:spcBef>
-                        <a:spcAft>
-                          <a:spcPts val="0"/>
-                        </a:spcAft>
-                      </a:pPr>
-                      <a:r>
-                        <a:rPr lang="en-US" sz="1400">
-                          <a:effectLst/>
-                        </a:rPr>
-                        <a:t>25%</a:t>
-                      </a:r>
-                      <a:endParaRPr lang="en-US" sz="1400">
-                        <a:effectLst/>
-                        <a:latin typeface="Calibri" panose="020F0502020204030204" pitchFamily="34" charset="0"/>
-                        <a:ea typeface="Calibri" panose="020F0502020204030204" pitchFamily="34" charset="0"/>
-                        <a:cs typeface="Times New Roman" panose="02020603050405020304" pitchFamily="18" charset="0"/>
-                      </a:endParaRPr>
-                    </a:p>
-                  </a:txBody>
-                  <a:tcPr marL="68580" marR="68580" marT="0" marB="0"/>
-                </a:tc>
-                <a:tc>
-                  <a:txBody>
-                    <a:bodyPr/>
-                    <a:lstStyle/>
-                    <a:p>
-                      <a:pPr marL="0" marR="0" algn="ctr">
-                        <a:lnSpc>
-                          <a:spcPct val="115000"/>
-                        </a:lnSpc>
-                        <a:spcBef>
-                          <a:spcPts val="0"/>
-                        </a:spcBef>
-                        <a:spcAft>
-                          <a:spcPts val="0"/>
-                        </a:spcAft>
-                      </a:pPr>
-                      <a:r>
-                        <a:rPr lang="en-US" sz="1400" dirty="0">
-                          <a:effectLst/>
-                        </a:rPr>
-                        <a:t>Select a language and IDE/Tools that mesh well together</a:t>
-                      </a:r>
-                      <a:endParaRPr lang="en-US" sz="1400" dirty="0">
-                        <a:effectLst/>
-                        <a:latin typeface="Calibri" panose="020F0502020204030204" pitchFamily="34" charset="0"/>
-                        <a:ea typeface="Calibri" panose="020F0502020204030204" pitchFamily="34" charset="0"/>
-                        <a:cs typeface="Times New Roman" panose="02020603050405020304" pitchFamily="18" charset="0"/>
-                      </a:endParaRPr>
-                    </a:p>
-                  </a:txBody>
-                  <a:tcPr marL="68580" marR="68580" marT="0" marB="0"/>
-                </a:tc>
-              </a:tr>
-            </a:tbl>
-          </a:graphicData>
-        </a:graphic>
-      </p:graphicFrame>
-    </p:spTree>
-    <p:extLst>
-      <p:ext uri="{BB962C8B-B14F-4D97-AF65-F5344CB8AC3E}">
-        <p14:creationId xmlns:p14="http://schemas.microsoft.com/office/powerpoint/2010/main" val="849243942"/>
-      </p:ext>
-    </p:extLst>
-  </p:cSld>
-  <p:clrMapOvr>
-    <a:masterClrMapping/>
-  </p:clrMapOvr>
-</p:sld>
-</file>
-
-<file path=ppt/slides/slide3.xml><?xml version="1.0" encoding="utf-8"?>
-<p:sld xmlns:a="http://schemas.openxmlformats.org/drawingml/2006/main" xmlns:r="http://schemas.openxmlformats.org/officeDocument/2006/relationships" xmlns:p="http://schemas.openxmlformats.org/presentationml/2006/main">
-  <p:cSld>
-    <p:spTree>
-      <p:nvGrpSpPr>
-        <p:cNvPr id="1" name=""/>
-        <p:cNvGrpSpPr/>
-        <p:nvPr/>
-      </p:nvGrpSpPr>
-      <p:grpSpPr>
-        <a:xfrm>
-          <a:off x="0" y="0"/>
-          <a:ext cx="0" cy="0"/>
-          <a:chOff x="0" y="0"/>
-          <a:chExt cx="0" cy="0"/>
-        </a:xfrm>
-      </p:grpSpPr>
-      <p:sp>
-        <p:nvSpPr>
-          <p:cNvPr id="2" name="Title 1"/>
-          <p:cNvSpPr>
-            <a:spLocks noGrp="1"/>
-          </p:cNvSpPr>
-          <p:nvPr>
-            <p:ph type="title"/>
-          </p:nvPr>
-        </p:nvSpPr>
-        <p:spPr/>
-        <p:txBody>
-          <a:bodyPr/>
-          <a:lstStyle/>
-          <a:p>
-            <a:r>
-              <a:rPr lang="en-US" dirty="0" smtClean="0"/>
-              <a:t>Previous Goals</a:t>
-            </a:r>
-            <a:endParaRPr lang="en-US" dirty="0"/>
-          </a:p>
-        </p:txBody>
-      </p:sp>
-      <p:graphicFrame>
-        <p:nvGraphicFramePr>
-          <p:cNvPr id="6" name="Content Placeholder 5"/>
-          <p:cNvGraphicFramePr>
-            <a:graphicFrameLocks noGrp="1"/>
-          </p:cNvGraphicFramePr>
-          <p:nvPr>
-            <p:ph idx="1"/>
-            <p:extLst>
-              <p:ext uri="{D42A27DB-BD31-4B8C-83A1-F6EECF244321}">
-                <p14:modId xmlns:p14="http://schemas.microsoft.com/office/powerpoint/2010/main" val="4166872388"/>
+                <p14:modId xmlns:p14="http://schemas.microsoft.com/office/powerpoint/2010/main" val="1064850087"/>
               </p:ext>
             </p:extLst>
           </p:nvPr>
@@ -5378,7 +4474,7 @@
                           <a:ea typeface="+mn-ea"/>
                           <a:cs typeface="+mn-cs"/>
                         </a:rPr>
-                        <a:t>Evaluate Selected Tools with Small Examples to Analyze Integration/Cohesiveness of Tools</a:t>
+                        <a:t> </a:t>
                       </a:r>
                       <a:endParaRPr lang="en-US" sz="1400" dirty="0">
                         <a:effectLst/>
@@ -5407,10 +4503,10 @@
                         </a:spcAft>
                       </a:pPr>
                       <a:r>
-                        <a:rPr lang="en-US" sz="1400" dirty="0">
+                        <a:rPr lang="en-US" sz="1400" dirty="0" smtClean="0">
                           <a:effectLst/>
                         </a:rPr>
-                        <a:t>100%</a:t>
+                        <a:t> </a:t>
                       </a:r>
                       <a:endParaRPr lang="en-US" sz="1400" dirty="0">
                         <a:effectLst/>
@@ -5442,7 +4538,7 @@
                         <a:rPr lang="en-US" sz="1400" dirty="0" smtClean="0">
                           <a:effectLst/>
                         </a:rPr>
-                        <a:t>25%</a:t>
+                        <a:t> </a:t>
                       </a:r>
                       <a:endParaRPr lang="en-US" sz="1400" dirty="0">
                         <a:effectLst/>
@@ -5474,7 +4570,7 @@
                         <a:rPr lang="en-US" sz="1400" dirty="0" smtClean="0">
                           <a:effectLst/>
                         </a:rPr>
-                        <a:t>25%</a:t>
+                        <a:t> </a:t>
                       </a:r>
                       <a:endParaRPr lang="en-US" sz="1400" dirty="0">
                         <a:effectLst/>
@@ -5509,7 +4605,7 @@
                           <a:ea typeface="+mn-ea"/>
                           <a:cs typeface="+mn-cs"/>
                         </a:rPr>
-                        <a:t>25%</a:t>
+                        <a:t> </a:t>
                       </a:r>
                       <a:endParaRPr lang="en-US" sz="1400" dirty="0">
                         <a:effectLst/>
@@ -5544,7 +4640,7 @@
                           <a:ea typeface="+mn-ea"/>
                           <a:cs typeface="+mn-cs"/>
                         </a:rPr>
-                        <a:t>25%</a:t>
+                        <a:t> </a:t>
                       </a:r>
                       <a:endParaRPr lang="en-US" sz="1400" dirty="0">
                         <a:effectLst/>
@@ -5579,16 +4675,7 @@
                           <a:ea typeface="+mn-ea"/>
                           <a:cs typeface="+mn-cs"/>
                         </a:rPr>
-                        <a:t>Also</a:t>
-                      </a:r>
-                      <a:r>
-                        <a:rPr lang="en-US" sz="1400" baseline="0" dirty="0" smtClean="0">
-                          <a:effectLst/>
-                          <a:latin typeface="+mn-lt"/>
-                          <a:ea typeface="+mn-ea"/>
-                          <a:cs typeface="+mn-cs"/>
-                        </a:rPr>
-                        <a:t> include the skeleton infrastructure in order to connect to a database</a:t>
+                        <a:t> </a:t>
                       </a:r>
                       <a:endParaRPr lang="en-US" sz="1400" dirty="0">
                         <a:effectLst/>
@@ -5628,7 +4715,7 @@
                           <a:ea typeface="+mn-ea"/>
                           <a:cs typeface="+mn-cs"/>
                         </a:rPr>
-                        <a:t>Begin Drafting Design of Program and GUI</a:t>
+                        <a:t> </a:t>
                       </a:r>
                       <a:endParaRPr lang="en-US" sz="1400" dirty="0">
                         <a:effectLst/>
@@ -5657,10 +4744,10 @@
                         </a:spcAft>
                       </a:pPr>
                       <a:r>
-                        <a:rPr lang="en-US" sz="1400" dirty="0">
+                        <a:rPr lang="en-US" sz="1400" dirty="0" smtClean="0">
                           <a:effectLst/>
                         </a:rPr>
-                        <a:t>100%</a:t>
+                        <a:t> </a:t>
                       </a:r>
                       <a:endParaRPr lang="en-US" sz="1400" dirty="0">
                         <a:effectLst/>
@@ -5695,7 +4782,7 @@
                           <a:ea typeface="+mn-ea"/>
                           <a:cs typeface="+mn-cs"/>
                         </a:rPr>
-                        <a:t>0%</a:t>
+                        <a:t> </a:t>
                       </a:r>
                       <a:endParaRPr lang="en-US" sz="1400" dirty="0">
                         <a:effectLst/>
@@ -5730,7 +4817,7 @@
                           <a:ea typeface="+mn-ea"/>
                           <a:cs typeface="+mn-cs"/>
                         </a:rPr>
-                        <a:t>0%</a:t>
+                        <a:t> </a:t>
                       </a:r>
                       <a:endParaRPr lang="en-US" sz="1400" dirty="0">
                         <a:effectLst/>
@@ -5765,7 +4852,7 @@
                           <a:ea typeface="+mn-ea"/>
                           <a:cs typeface="+mn-cs"/>
                         </a:rPr>
-                        <a:t>50%</a:t>
+                        <a:t> </a:t>
                       </a:r>
                       <a:endParaRPr lang="en-US" sz="1400" dirty="0">
                         <a:effectLst/>
@@ -5800,7 +4887,7 @@
                           <a:ea typeface="+mn-ea"/>
                           <a:cs typeface="+mn-cs"/>
                         </a:rPr>
-                        <a:t>50%</a:t>
+                        <a:t> </a:t>
                       </a:r>
                       <a:endParaRPr lang="en-US" sz="1400" dirty="0">
                         <a:effectLst/>
@@ -5835,25 +4922,7 @@
                           <a:ea typeface="+mn-ea"/>
                           <a:cs typeface="+mn-cs"/>
                         </a:rPr>
-                        <a:t>Create</a:t>
-                      </a:r>
-                      <a:r>
-                        <a:rPr lang="en-US" sz="1400" baseline="0" dirty="0" smtClean="0">
-                          <a:effectLst/>
-                          <a:latin typeface="+mn-lt"/>
-                          <a:ea typeface="+mn-ea"/>
-                          <a:cs typeface="+mn-cs"/>
-                        </a:rPr>
-                        <a:t> a basic GUI and sample code </a:t>
-                      </a:r>
-                      <a:r>
-                        <a:rPr lang="en-US" sz="1400" baseline="0" dirty="0" err="1" smtClean="0">
-                          <a:effectLst/>
-                          <a:latin typeface="+mn-lt"/>
-                          <a:ea typeface="+mn-ea"/>
-                          <a:cs typeface="+mn-cs"/>
-                        </a:rPr>
-                        <a:t>snippits</a:t>
+                        <a:t> </a:t>
                       </a:r>
                       <a:endParaRPr lang="en-US" sz="1400" dirty="0">
                         <a:effectLst/>
@@ -5870,6 +4939,67 @@
           </a:graphicData>
         </a:graphic>
       </p:graphicFrame>
+    </p:spTree>
+    <p:extLst>
+      <p:ext uri="{BB962C8B-B14F-4D97-AF65-F5344CB8AC3E}">
+        <p14:creationId xmlns:p14="http://schemas.microsoft.com/office/powerpoint/2010/main" val="4270080904"/>
+      </p:ext>
+    </p:extLst>
+  </p:cSld>
+  <p:clrMapOvr>
+    <a:masterClrMapping/>
+  </p:clrMapOvr>
+</p:sld>
+</file>
+
+<file path=ppt/slides/slide3.xml><?xml version="1.0" encoding="utf-8"?>
+<p:sld xmlns:a="http://schemas.openxmlformats.org/drawingml/2006/main" xmlns:r="http://schemas.openxmlformats.org/officeDocument/2006/relationships" xmlns:p="http://schemas.openxmlformats.org/presentationml/2006/main">
+  <p:cSld>
+    <p:spTree>
+      <p:nvGrpSpPr>
+        <p:cNvPr id="1" name=""/>
+        <p:cNvGrpSpPr/>
+        <p:nvPr/>
+      </p:nvGrpSpPr>
+      <p:grpSpPr>
+        <a:xfrm>
+          <a:off x="0" y="0"/>
+          <a:ext cx="0" cy="0"/>
+          <a:chOff x="0" y="0"/>
+          <a:chExt cx="0" cy="0"/>
+        </a:xfrm>
+      </p:grpSpPr>
+      <p:sp>
+        <p:nvSpPr>
+          <p:cNvPr id="2" name="Title 1"/>
+          <p:cNvSpPr>
+            <a:spLocks noGrp="1"/>
+          </p:cNvSpPr>
+          <p:nvPr>
+            <p:ph type="title"/>
+          </p:nvPr>
+        </p:nvSpPr>
+        <p:spPr/>
+        <p:txBody>
+          <a:bodyPr/>
+          <a:lstStyle/>
+          <a:p>
+            <a:r>
+              <a:rPr lang="en-US" dirty="0" smtClean="0"/>
+              <a:t>Milestone </a:t>
+            </a:r>
+            <a:r>
+              <a:rPr lang="en-US" dirty="0" smtClean="0"/>
+              <a:t>2 </a:t>
+            </a:r>
+            <a:r>
+              <a:rPr lang="en-US" dirty="0" smtClean="0"/>
+              <a:t>Accomplishment Summary</a:t>
+            </a:r>
+            <a:endParaRPr lang="en-US" dirty="0"/>
+          </a:p>
+        </p:txBody>
+      </p:sp>
     </p:spTree>
     <p:extLst>
       <p:ext uri="{BB962C8B-B14F-4D97-AF65-F5344CB8AC3E}">
@@ -5916,9 +5046,45 @@
           <a:lstStyle/>
           <a:p>
             <a:r>
-              <a:rPr lang="en-US" dirty="0" smtClean="0"/>
-              <a:t>Milestone 1 Accomplishment Summary</a:t>
-            </a:r>
+              <a:rPr lang="en-US" u="sng" dirty="0" smtClean="0"/>
+              <a:t>Obtain Requirement Document From GE</a:t>
+            </a:r>
+            <a:endParaRPr lang="en-US" dirty="0"/>
+          </a:p>
+        </p:txBody>
+      </p:sp>
+      <p:sp>
+        <p:nvSpPr>
+          <p:cNvPr id="7" name="TextBox 6"/>
+          <p:cNvSpPr txBox="1"/>
+          <p:nvPr/>
+        </p:nvSpPr>
+        <p:spPr>
+          <a:xfrm>
+            <a:off x="406402" y="1451429"/>
+            <a:ext cx="11379198" cy="1231106"/>
+          </a:xfrm>
+          <a:prstGeom prst="rect">
+            <a:avLst/>
+          </a:prstGeom>
+          <a:noFill/>
+        </p:spPr>
+        <p:txBody>
+          <a:bodyPr wrap="square" rtlCol="0">
+            <a:spAutoFit/>
+          </a:bodyPr>
+          <a:lstStyle/>
+          <a:p>
+            <a:r>
+              <a:rPr lang="en-US" sz="2800" dirty="0" smtClean="0"/>
+              <a:t> </a:t>
+            </a:r>
+            <a:endParaRPr lang="en-US" sz="2800" dirty="0" smtClean="0"/>
+          </a:p>
+          <a:p>
+            <a:endParaRPr lang="en-US" sz="2800" dirty="0" smtClean="0"/>
+          </a:p>
+          <a:p>
             <a:endParaRPr lang="en-US" dirty="0"/>
           </a:p>
         </p:txBody>
@@ -5969,8 +5135,8 @@
           <a:lstStyle/>
           <a:p>
             <a:r>
-              <a:rPr lang="en-US" u="sng" dirty="0" smtClean="0"/>
-              <a:t>Obtain Requirement Document From GE</a:t>
+              <a:rPr lang="en-US" dirty="0" smtClean="0"/>
+              <a:t>Requirements</a:t>
             </a:r>
             <a:endParaRPr lang="en-US" dirty="0"/>
           </a:p>
@@ -5978,49 +5144,29 @@
       </p:sp>
       <p:sp>
         <p:nvSpPr>
-          <p:cNvPr id="7" name="TextBox 6"/>
-          <p:cNvSpPr txBox="1"/>
-          <p:nvPr/>
-        </p:nvSpPr>
-        <p:spPr>
-          <a:xfrm>
-            <a:off x="406402" y="1451429"/>
-            <a:ext cx="11379198" cy="3385542"/>
-          </a:xfrm>
-          <a:prstGeom prst="rect">
-            <a:avLst/>
-          </a:prstGeom>
-          <a:noFill/>
-        </p:spPr>
-        <p:txBody>
-          <a:bodyPr wrap="square" rtlCol="0">
-            <a:spAutoFit/>
-          </a:bodyPr>
-          <a:lstStyle/>
-          <a:p>
-            <a:r>
-              <a:rPr lang="en-US" sz="2800" dirty="0" smtClean="0"/>
-              <a:t>At the conclusion of our second team meeting with Dan </a:t>
-            </a:r>
-            <a:r>
-              <a:rPr lang="en-US" sz="2800" dirty="0" err="1" smtClean="0"/>
-              <a:t>Ballesty</a:t>
-            </a:r>
-            <a:r>
-              <a:rPr lang="en-US" sz="2800" dirty="0" smtClean="0"/>
-              <a:t>, he informed us that he would sit down with the subject matter experts at GE and decide on what functionality they wanted the tool to provide them. Shortly after the meeting we received an email containing the</a:t>
-            </a:r>
-          </a:p>
-          <a:p>
-            <a:r>
-              <a:rPr lang="en-US" sz="2800" dirty="0" smtClean="0"/>
-              <a:t> formalized list of requirements for the project. The document includes five requirements.</a:t>
-            </a:r>
-          </a:p>
-          <a:p>
-            <a:endParaRPr lang="en-US" sz="2800" dirty="0" smtClean="0"/>
-          </a:p>
-          <a:p>
+          <p:cNvPr id="3" name="Content Placeholder 2"/>
+          <p:cNvSpPr>
+            <a:spLocks noGrp="1"/>
+          </p:cNvSpPr>
+          <p:nvPr>
+            <p:ph idx="1"/>
+          </p:nvPr>
+        </p:nvSpPr>
+        <p:spPr/>
+        <p:txBody>
+          <a:bodyPr/>
+          <a:lstStyle/>
+          <a:p>
+            <a:r>
+              <a:rPr lang="en-US" dirty="0" smtClean="0"/>
+              <a:t> </a:t>
+            </a:r>
+            <a:endParaRPr lang="en-US" dirty="0" smtClean="0"/>
+          </a:p>
+          <a:p>
+            <a:pPr marL="137160" indent="0">
+              <a:buNone/>
+            </a:pPr>
             <a:endParaRPr lang="en-US" dirty="0"/>
           </a:p>
         </p:txBody>
@@ -6028,7 +5174,7 @@
     </p:spTree>
     <p:extLst>
       <p:ext uri="{BB962C8B-B14F-4D97-AF65-F5344CB8AC3E}">
-        <p14:creationId xmlns:p14="http://schemas.microsoft.com/office/powerpoint/2010/main" val="4270080904"/>
+        <p14:creationId xmlns:p14="http://schemas.microsoft.com/office/powerpoint/2010/main" val="207691532"/>
       </p:ext>
     </p:extLst>
   </p:cSld>
@@ -6095,86 +5241,16 @@
           <a:p>
             <a:r>
               <a:rPr lang="en-US" dirty="0" smtClean="0"/>
-              <a:t>I. Include formulas to calculate </a:t>
-            </a:r>
-          </a:p>
-          <a:p>
-            <a:pPr lvl="1"/>
-            <a:r>
-              <a:rPr lang="en-US" dirty="0" smtClean="0"/>
-              <a:t>1</a:t>
-            </a:r>
-            <a:r>
-              <a:rPr lang="en-US" dirty="0" smtClean="0"/>
-              <a:t>. Safe breaking Distance</a:t>
-            </a:r>
-          </a:p>
-          <a:p>
-            <a:pPr lvl="1"/>
-            <a:r>
-              <a:rPr lang="en-US" dirty="0" smtClean="0"/>
-              <a:t>2. </a:t>
-            </a:r>
-            <a:r>
-              <a:rPr lang="en-US" dirty="0" smtClean="0"/>
-              <a:t>Headway Calculations</a:t>
-            </a:r>
-          </a:p>
-          <a:p>
-            <a:pPr lvl="1"/>
-            <a:r>
-              <a:rPr lang="en-US" dirty="0" smtClean="0"/>
-              <a:t>3. Runtime Performance Calculations</a:t>
-            </a:r>
-          </a:p>
-          <a:p>
-            <a:pPr lvl="1"/>
-            <a:r>
-              <a:rPr lang="en-US" dirty="0" smtClean="0"/>
-              <a:t>4. Clear Time </a:t>
-            </a:r>
-            <a:r>
-              <a:rPr lang="en-US" dirty="0" smtClean="0"/>
-              <a:t>Calculations	</a:t>
+              <a:t> </a:t>
             </a:r>
             <a:endParaRPr lang="en-US" dirty="0" smtClean="0"/>
-          </a:p>
-          <a:p>
-            <a:pPr lvl="1"/>
-            <a:r>
-              <a:rPr lang="en-US" dirty="0" smtClean="0"/>
-              <a:t>5. Approach Locking Time </a:t>
-            </a:r>
-            <a:r>
-              <a:rPr lang="en-US" dirty="0" smtClean="0"/>
-              <a:t>Calculations</a:t>
-            </a:r>
-            <a:endParaRPr lang="en-US" dirty="0" smtClean="0"/>
-          </a:p>
-          <a:p>
-            <a:r>
-              <a:rPr lang="en-US" dirty="0" smtClean="0"/>
-              <a:t>II. Ability to connect to Database</a:t>
-            </a:r>
-          </a:p>
-          <a:p>
-            <a:r>
-              <a:rPr lang="en-US" dirty="0" smtClean="0"/>
-              <a:t>III. Perform analysis on data provided</a:t>
-            </a:r>
-          </a:p>
-          <a:p>
-            <a:pPr marL="137160" indent="0">
-              <a:buNone/>
-            </a:pPr>
-            <a:endParaRPr lang="en-US" dirty="0"/>
           </a:p>
         </p:txBody>
       </p:sp>
     </p:spTree>
     <p:extLst>
       <p:ext uri="{BB962C8B-B14F-4D97-AF65-F5344CB8AC3E}">
-        <p14:creationId xmlns:p14="http://schemas.microsoft.com/office/powerpoint/2010/main" val="207691532"/>
+        <p14:creationId xmlns:p14="http://schemas.microsoft.com/office/powerpoint/2010/main" val="2891250505"/>
       </p:ext>
     </p:extLst>
   </p:cSld>
@@ -6213,70 +5289,46 @@
         </p:nvSpPr>
         <p:spPr/>
         <p:txBody>
+          <a:bodyPr>
+            <a:normAutofit/>
+          </a:bodyPr>
+          <a:lstStyle/>
+          <a:p>
+            <a:r>
+              <a:rPr lang="en-US" dirty="0" smtClean="0"/>
+              <a:t>Test Plan</a:t>
+            </a:r>
+            <a:endParaRPr lang="en-US" dirty="0"/>
+          </a:p>
+        </p:txBody>
+      </p:sp>
+      <p:sp>
+        <p:nvSpPr>
+          <p:cNvPr id="3" name="Content Placeholder 2"/>
+          <p:cNvSpPr>
+            <a:spLocks noGrp="1"/>
+          </p:cNvSpPr>
+          <p:nvPr>
+            <p:ph idx="1"/>
+          </p:nvPr>
+        </p:nvSpPr>
+        <p:spPr/>
+        <p:txBody>
           <a:bodyPr/>
           <a:lstStyle/>
           <a:p>
             <a:r>
               <a:rPr lang="en-US" dirty="0" smtClean="0"/>
-              <a:t>Requirements</a:t>
+              <a:t> </a:t>
             </a:r>
             <a:endParaRPr lang="en-US" dirty="0"/>
-          </a:p>
-        </p:txBody>
-      </p:sp>
-      <p:sp>
-        <p:nvSpPr>
-          <p:cNvPr id="3" name="Content Placeholder 2"/>
-          <p:cNvSpPr>
-            <a:spLocks noGrp="1"/>
-          </p:cNvSpPr>
-          <p:nvPr>
-            <p:ph idx="1"/>
-          </p:nvPr>
-        </p:nvSpPr>
-        <p:spPr/>
-        <p:txBody>
-          <a:bodyPr/>
-          <a:lstStyle/>
-          <a:p>
-            <a:r>
-              <a:rPr lang="en-US" dirty="0" smtClean="0"/>
-              <a:t>IV. Be able to display</a:t>
-            </a:r>
-          </a:p>
-          <a:p>
-            <a:pPr lvl="1"/>
-            <a:r>
-              <a:rPr lang="en-US" dirty="0" smtClean="0"/>
-              <a:t>1. Excel formatted spreadsheets</a:t>
-            </a:r>
-          </a:p>
-          <a:p>
-            <a:pPr lvl="1"/>
-            <a:r>
-              <a:rPr lang="en-US" dirty="0" smtClean="0"/>
-              <a:t>2. Track and Train Graphs</a:t>
-            </a:r>
-          </a:p>
-          <a:p>
-            <a:pPr lvl="1"/>
-            <a:r>
-              <a:rPr lang="en-US" dirty="0" smtClean="0"/>
-              <a:t>3. Train simulations</a:t>
-            </a:r>
-          </a:p>
-          <a:p>
-            <a:r>
-              <a:rPr lang="en-US" dirty="0" smtClean="0"/>
-              <a:t>V. Output to specific file types</a:t>
-            </a:r>
           </a:p>
         </p:txBody>
       </p:sp>
     </p:spTree>
     <p:extLst>
       <p:ext uri="{BB962C8B-B14F-4D97-AF65-F5344CB8AC3E}">
-        <p14:creationId xmlns:p14="http://schemas.microsoft.com/office/powerpoint/2010/main" val="2891250505"/>
+        <p14:creationId xmlns:p14="http://schemas.microsoft.com/office/powerpoint/2010/main" val="3042954688"/>
       </p:ext>
     </p:extLst>
   </p:cSld>
@@ -6316,13 +5368,13 @@
         <p:spPr/>
         <p:txBody>
           <a:bodyPr>
-            <a:normAutofit/>
+            <a:normAutofit fontScale="90000"/>
           </a:bodyPr>
           <a:lstStyle/>
           <a:p>
             <a:r>
-              <a:rPr lang="en-US" dirty="0" smtClean="0"/>
-              <a:t>Test Plan</a:t>
+              <a:rPr lang="en-US" u="sng" dirty="0" smtClean="0"/>
+              <a:t>Decide on IDE/Programming Language/Database Tools</a:t>
             </a:r>
             <a:endParaRPr lang="en-US" dirty="0"/>
           </a:p>
@@ -6330,47 +5382,33 @@
       </p:sp>
       <p:sp>
         <p:nvSpPr>
-          <p:cNvPr id="3" name="Content Placeholder 2"/>
-          <p:cNvSpPr>
-            <a:spLocks noGrp="1"/>
-          </p:cNvSpPr>
-          <p:nvPr>
-            <p:ph idx="1"/>
-          </p:nvPr>
-        </p:nvSpPr>
-        <p:spPr/>
-        <p:txBody>
-          <a:bodyPr/>
-          <a:lstStyle/>
-          <a:p>
-            <a:r>
-              <a:rPr lang="en-US" dirty="0" smtClean="0"/>
-              <a:t>Compare calculations from our formulas to the ones given to us by GE.</a:t>
-            </a:r>
-          </a:p>
-          <a:p>
-            <a:r>
-              <a:rPr lang="en-US" dirty="0" smtClean="0"/>
-              <a:t>Ensure functionality of current GUI layout(</a:t>
-            </a:r>
-            <a:r>
-              <a:rPr lang="en-US" dirty="0" err="1" smtClean="0"/>
-              <a:t>ie</a:t>
-            </a:r>
-            <a:r>
-              <a:rPr lang="en-US" dirty="0" smtClean="0"/>
-              <a:t> Ensure you can perform a feature tour and the GUI will not crash)</a:t>
-            </a:r>
-          </a:p>
-          <a:p>
-            <a:r>
-              <a:rPr lang="en-US" dirty="0" smtClean="0"/>
-              <a:t>Ensure data can be successfully entered and then retrieved from our database and that the data entered and retrieved </a:t>
-            </a:r>
-            <a:r>
-              <a:rPr lang="en-US" smtClean="0"/>
-              <a:t>is correct</a:t>
-            </a:r>
+          <p:cNvPr id="5" name="TextBox 4"/>
+          <p:cNvSpPr txBox="1"/>
+          <p:nvPr/>
+        </p:nvSpPr>
+        <p:spPr>
+          <a:xfrm>
+            <a:off x="595085" y="1785258"/>
+            <a:ext cx="10892413" cy="738664"/>
+          </a:xfrm>
+          <a:prstGeom prst="rect">
+            <a:avLst/>
+          </a:prstGeom>
+          <a:noFill/>
+        </p:spPr>
+        <p:txBody>
+          <a:bodyPr wrap="square" rtlCol="0">
+            <a:spAutoFit/>
+          </a:bodyPr>
+          <a:lstStyle/>
+          <a:p>
+            <a:r>
+              <a:rPr lang="en-US" sz="2400" dirty="0" smtClean="0"/>
+              <a:t> </a:t>
+            </a:r>
+            <a:endParaRPr lang="en-US" sz="2400" dirty="0" smtClean="0"/>
+          </a:p>
+          <a:p>
             <a:endParaRPr lang="en-US" dirty="0"/>
           </a:p>
         </p:txBody>
@@ -6378,7 +5416,7 @@
     </p:spTree>
     <p:extLst>
       <p:ext uri="{BB962C8B-B14F-4D97-AF65-F5344CB8AC3E}">
-        <p14:creationId xmlns:p14="http://schemas.microsoft.com/office/powerpoint/2010/main" val="3042954688"/>
+        <p14:creationId xmlns:p14="http://schemas.microsoft.com/office/powerpoint/2010/main" val="4270080904"/>
       </p:ext>
     </p:extLst>
   </p:cSld>
@@ -6424,7 +5462,7 @@
           <a:p>
             <a:r>
               <a:rPr lang="en-US" u="sng" dirty="0" smtClean="0"/>
-              <a:t>Decide on IDE/Programming Language/Database Tools</a:t>
+              <a:t>Evaluate Selected Tools with Small Examples to Analyze Integration/Cohesiveness of Tools:</a:t>
             </a:r>
             <a:endParaRPr lang="en-US" dirty="0"/>
           </a:p>
@@ -6439,7 +5477,7 @@
         <p:spPr>
           <a:xfrm>
             <a:off x="595085" y="1785258"/>
-            <a:ext cx="10892413" cy="4062651"/>
+            <a:ext cx="10892413" cy="738664"/>
           </a:xfrm>
           <a:prstGeom prst="rect">
             <a:avLst/>
@@ -6454,50 +5492,7 @@
           <a:p>
             <a:r>
               <a:rPr lang="en-US" sz="2400" dirty="0" smtClean="0"/>
-              <a:t>At the beginning of our third meeting with Dan </a:t>
-            </a:r>
-            <a:r>
-              <a:rPr lang="en-US" sz="2400" dirty="0" err="1" smtClean="0"/>
-              <a:t>Ballesty</a:t>
-            </a:r>
-            <a:r>
-              <a:rPr lang="en-US" sz="2400" dirty="0" smtClean="0"/>
-              <a:t>, we reviewed the requirements document and held an open conversation as to which tools/IDE/programming language/database software would provide the greatest amount of ease throughout the project. The decisions that we made were:</a:t>
-            </a:r>
-          </a:p>
-          <a:p>
-            <a:endParaRPr lang="en-US" sz="2400" dirty="0" smtClean="0"/>
-          </a:p>
-          <a:p>
-            <a:pPr lvl="0"/>
-            <a:r>
-              <a:rPr lang="en-US" sz="2400" dirty="0" smtClean="0"/>
-              <a:t>IDE:  Visual Studio</a:t>
-            </a:r>
-          </a:p>
-          <a:p>
-            <a:pPr lvl="0"/>
-            <a:r>
-              <a:rPr lang="en-US" sz="2400" dirty="0" smtClean="0"/>
-              <a:t>Programming Language: C#/.NET</a:t>
-            </a:r>
-          </a:p>
-          <a:p>
-            <a:pPr lvl="0"/>
-            <a:r>
-              <a:rPr lang="en-US" sz="2400" dirty="0" smtClean="0"/>
-              <a:t>Tools: Windows Forms (For GUI), Photoshop for GUI design</a:t>
-            </a:r>
-          </a:p>
-          <a:p>
-            <a:pPr lvl="0"/>
-            <a:r>
-              <a:rPr lang="en-US" sz="2400" dirty="0" smtClean="0"/>
-              <a:t>Database Tools: </a:t>
-            </a:r>
-            <a:r>
-              <a:rPr lang="en-US" sz="2400" dirty="0" err="1" smtClean="0"/>
-              <a:t>MySQL</a:t>
+              <a:t> </a:t>
             </a:r>
             <a:endParaRPr lang="en-US" sz="2400" dirty="0" smtClean="0"/>
           </a:p>

</xml_diff>

<commit_message>
Finished milestone 2 pres
</commit_message>
<xml_diff>
--- a/Documents/Presentations/Milestone 2 presentation.pptx
+++ b/Documents/Presentations/Milestone 2 presentation.pptx
@@ -9,16 +9,11 @@
     <p:sldId id="266" r:id="rId3"/>
     <p:sldId id="267" r:id="rId4"/>
     <p:sldId id="268" r:id="rId5"/>
-    <p:sldId id="272" r:id="rId6"/>
-    <p:sldId id="273" r:id="rId7"/>
-    <p:sldId id="274" r:id="rId8"/>
-    <p:sldId id="269" r:id="rId9"/>
-    <p:sldId id="270" r:id="rId10"/>
-    <p:sldId id="271" r:id="rId11"/>
-    <p:sldId id="260" r:id="rId12"/>
-    <p:sldId id="262" r:id="rId13"/>
-    <p:sldId id="264" r:id="rId14"/>
-    <p:sldId id="265" r:id="rId15"/>
+    <p:sldId id="269" r:id="rId6"/>
+    <p:sldId id="260" r:id="rId7"/>
+    <p:sldId id="262" r:id="rId8"/>
+    <p:sldId id="264" r:id="rId9"/>
+    <p:sldId id="265" r:id="rId10"/>
   </p:sldIdLst>
   <p:sldSz cx="12192000" cy="6858000"/>
   <p:notesSz cx="6858000" cy="9144000"/>
@@ -119,7 +114,7 @@
   </p:defaultTextStyle>
   <p:extLst>
     <p:ext uri="{EFAFB233-063F-42B5-8137-9DF3F51BA10A}">
-      <p15:sldGuideLst xmlns:p15="http://schemas.microsoft.com/office/powerpoint/2012/main">
+      <p15:sldGuideLst xmlns="" xmlns:p15="http://schemas.microsoft.com/office/powerpoint/2012/main">
         <p15:guide id="1" orient="horz" pos="2160">
           <p15:clr>
             <a:srgbClr val="A4A3A4"/>
@@ -3244,896 +3239,9 @@
     </p:spTree>
     <p:extLst>
       <p:ext uri="{BB962C8B-B14F-4D97-AF65-F5344CB8AC3E}">
-        <p14:creationId xmlns:p14="http://schemas.microsoft.com/office/powerpoint/2010/main" val="515178540"/>
+        <p14:creationId xmlns="" xmlns:p14="http://schemas.microsoft.com/office/powerpoint/2010/main" val="515178540"/>
       </p:ext>
     </p:extLst>
-  </p:cSld>
-  <p:clrMapOvr>
-    <a:masterClrMapping/>
-  </p:clrMapOvr>
-</p:sld>
-</file>
-
-<file path=ppt/slides/slide10.xml><?xml version="1.0" encoding="utf-8"?>
-<p:sld xmlns:a="http://schemas.openxmlformats.org/drawingml/2006/main" xmlns:r="http://schemas.openxmlformats.org/officeDocument/2006/relationships" xmlns:p="http://schemas.openxmlformats.org/presentationml/2006/main">
-  <p:cSld>
-    <p:spTree>
-      <p:nvGrpSpPr>
-        <p:cNvPr id="1" name=""/>
-        <p:cNvGrpSpPr/>
-        <p:nvPr/>
-      </p:nvGrpSpPr>
-      <p:grpSpPr>
-        <a:xfrm>
-          <a:off x="0" y="0"/>
-          <a:ext cx="0" cy="0"/>
-          <a:chOff x="0" y="0"/>
-          <a:chExt cx="0" cy="0"/>
-        </a:xfrm>
-      </p:grpSpPr>
-      <p:sp>
-        <p:nvSpPr>
-          <p:cNvPr id="2" name="Title 1"/>
-          <p:cNvSpPr>
-            <a:spLocks noGrp="1"/>
-          </p:cNvSpPr>
-          <p:nvPr>
-            <p:ph type="title"/>
-          </p:nvPr>
-        </p:nvSpPr>
-        <p:spPr/>
-        <p:txBody>
-          <a:bodyPr>
-            <a:normAutofit fontScale="90000"/>
-          </a:bodyPr>
-          <a:lstStyle/>
-          <a:p>
-            <a:r>
-              <a:rPr lang="en-US" u="sng" dirty="0" smtClean="0"/>
-              <a:t>Begin Drafting Design of Program and GUI</a:t>
-            </a:r>
-            <a:endParaRPr lang="en-US" dirty="0"/>
-          </a:p>
-        </p:txBody>
-      </p:sp>
-      <p:sp>
-        <p:nvSpPr>
-          <p:cNvPr id="5" name="TextBox 4"/>
-          <p:cNvSpPr txBox="1"/>
-          <p:nvPr/>
-        </p:nvSpPr>
-        <p:spPr>
-          <a:xfrm>
-            <a:off x="595085" y="1785258"/>
-            <a:ext cx="10892413" cy="738664"/>
-          </a:xfrm>
-          <a:prstGeom prst="rect">
-            <a:avLst/>
-          </a:prstGeom>
-          <a:noFill/>
-        </p:spPr>
-        <p:txBody>
-          <a:bodyPr wrap="square" rtlCol="0">
-            <a:spAutoFit/>
-          </a:bodyPr>
-          <a:lstStyle/>
-          <a:p>
-            <a:r>
-              <a:rPr lang="en-US" sz="2400" dirty="0" smtClean="0"/>
-              <a:t>   </a:t>
-            </a:r>
-            <a:endParaRPr lang="en-US" sz="2400" dirty="0" smtClean="0"/>
-          </a:p>
-          <a:p>
-            <a:endParaRPr lang="en-US" dirty="0"/>
-          </a:p>
-        </p:txBody>
-      </p:sp>
-    </p:spTree>
-    <p:extLst>
-      <p:ext uri="{BB962C8B-B14F-4D97-AF65-F5344CB8AC3E}">
-        <p14:creationId xmlns:p14="http://schemas.microsoft.com/office/powerpoint/2010/main" val="4270080904"/>
-      </p:ext>
-    </p:extLst>
-  </p:cSld>
-  <p:clrMapOvr>
-    <a:masterClrMapping/>
-  </p:clrMapOvr>
-</p:sld>
-</file>
-
-<file path=ppt/slides/slide11.xml><?xml version="1.0" encoding="utf-8"?>
-<p:sld xmlns:a="http://schemas.openxmlformats.org/drawingml/2006/main" xmlns:r="http://schemas.openxmlformats.org/officeDocument/2006/relationships" xmlns:p="http://schemas.openxmlformats.org/presentationml/2006/main">
-  <p:cSld>
-    <p:spTree>
-      <p:nvGrpSpPr>
-        <p:cNvPr id="1" name=""/>
-        <p:cNvGrpSpPr/>
-        <p:nvPr/>
-      </p:nvGrpSpPr>
-      <p:grpSpPr>
-        <a:xfrm>
-          <a:off x="0" y="0"/>
-          <a:ext cx="0" cy="0"/>
-          <a:chOff x="0" y="0"/>
-          <a:chExt cx="0" cy="0"/>
-        </a:xfrm>
-      </p:grpSpPr>
-      <p:sp>
-        <p:nvSpPr>
-          <p:cNvPr id="2" name="Title 1"/>
-          <p:cNvSpPr>
-            <a:spLocks noGrp="1"/>
-          </p:cNvSpPr>
-          <p:nvPr>
-            <p:ph type="title"/>
-          </p:nvPr>
-        </p:nvSpPr>
-        <p:spPr/>
-        <p:txBody>
-          <a:bodyPr/>
-          <a:lstStyle/>
-          <a:p>
-            <a:endParaRPr lang="en-US"/>
-          </a:p>
-        </p:txBody>
-      </p:sp>
-      <p:pic>
-        <p:nvPicPr>
-          <p:cNvPr id="4" name="Content Placeholder 3" descr="gegreenmachine.jpg"/>
-          <p:cNvPicPr>
-            <a:picLocks noGrp="1" noChangeAspect="1"/>
-          </p:cNvPicPr>
-          <p:nvPr>
-            <p:ph idx="1"/>
-          </p:nvPr>
-        </p:nvPicPr>
-        <p:blipFill>
-          <a:blip r:embed="rId2" cstate="print"/>
-          <a:stretch>
-            <a:fillRect/>
-          </a:stretch>
-        </p:blipFill>
-        <p:spPr>
-          <a:xfrm>
-            <a:off x="0" y="1416"/>
-            <a:ext cx="12192000" cy="6856584"/>
-          </a:xfrm>
-        </p:spPr>
-      </p:pic>
-      <p:sp>
-        <p:nvSpPr>
-          <p:cNvPr id="5" name="TextBox 4"/>
-          <p:cNvSpPr txBox="1"/>
-          <p:nvPr/>
-        </p:nvSpPr>
-        <p:spPr>
-          <a:xfrm>
-            <a:off x="6791233" y="190137"/>
-            <a:ext cx="4871847" cy="923330"/>
-          </a:xfrm>
-          <a:prstGeom prst="rect">
-            <a:avLst/>
-          </a:prstGeom>
-          <a:noFill/>
-        </p:spPr>
-        <p:txBody>
-          <a:bodyPr wrap="none" rtlCol="0">
-            <a:spAutoFit/>
-          </a:bodyPr>
-          <a:lstStyle/>
-          <a:p>
-            <a:r>
-              <a:rPr lang="en-US" sz="5400" smtClean="0">
-                <a:solidFill>
-                  <a:schemeClr val="bg1"/>
-                </a:solidFill>
-              </a:rPr>
-              <a:t>Next Milestone</a:t>
-            </a:r>
-            <a:endParaRPr lang="en-US" sz="5400" dirty="0">
-              <a:solidFill>
-                <a:schemeClr val="bg1"/>
-              </a:solidFill>
-            </a:endParaRPr>
-          </a:p>
-        </p:txBody>
-      </p:sp>
-    </p:spTree>
-    <p:extLst>
-      <p:ext uri="{BB962C8B-B14F-4D97-AF65-F5344CB8AC3E}">
-        <p14:creationId xmlns:p14="http://schemas.microsoft.com/office/powerpoint/2010/main" val="1202250340"/>
-      </p:ext>
-    </p:extLst>
-  </p:cSld>
-  <p:clrMapOvr>
-    <a:masterClrMapping/>
-  </p:clrMapOvr>
-</p:sld>
-</file>
-
-<file path=ppt/slides/slide12.xml><?xml version="1.0" encoding="utf-8"?>
-<p:sld xmlns:a="http://schemas.openxmlformats.org/drawingml/2006/main" xmlns:r="http://schemas.openxmlformats.org/officeDocument/2006/relationships" xmlns:p="http://schemas.openxmlformats.org/presentationml/2006/main">
-  <p:cSld>
-    <p:spTree>
-      <p:nvGrpSpPr>
-        <p:cNvPr id="1" name=""/>
-        <p:cNvGrpSpPr/>
-        <p:nvPr/>
-      </p:nvGrpSpPr>
-      <p:grpSpPr>
-        <a:xfrm>
-          <a:off x="0" y="0"/>
-          <a:ext cx="0" cy="0"/>
-          <a:chOff x="0" y="0"/>
-          <a:chExt cx="0" cy="0"/>
-        </a:xfrm>
-      </p:grpSpPr>
-      <p:sp>
-        <p:nvSpPr>
-          <p:cNvPr id="2" name="Title 1"/>
-          <p:cNvSpPr>
-            <a:spLocks noGrp="1"/>
-          </p:cNvSpPr>
-          <p:nvPr>
-            <p:ph type="title"/>
-          </p:nvPr>
-        </p:nvSpPr>
-        <p:spPr/>
-        <p:txBody>
-          <a:bodyPr/>
-          <a:lstStyle/>
-          <a:p>
-            <a:r>
-              <a:rPr lang="en-US" dirty="0" smtClean="0"/>
-              <a:t>Milestone </a:t>
-            </a:r>
-            <a:r>
-              <a:rPr lang="en-US" dirty="0" smtClean="0"/>
-              <a:t>3</a:t>
-            </a:r>
-            <a:endParaRPr lang="en-US" dirty="0"/>
-          </a:p>
-        </p:txBody>
-      </p:sp>
-      <p:sp>
-        <p:nvSpPr>
-          <p:cNvPr id="3" name="Content Placeholder 2"/>
-          <p:cNvSpPr>
-            <a:spLocks noGrp="1"/>
-          </p:cNvSpPr>
-          <p:nvPr>
-            <p:ph idx="1"/>
-          </p:nvPr>
-        </p:nvSpPr>
-        <p:spPr/>
-        <p:txBody>
-          <a:bodyPr/>
-          <a:lstStyle/>
-          <a:p>
-            <a:r>
-              <a:rPr lang="en-US" dirty="0" smtClean="0"/>
-              <a:t> </a:t>
-            </a:r>
-            <a:endParaRPr lang="en-US" dirty="0"/>
-          </a:p>
-          <a:p>
-            <a:pPr marL="137160" lvl="0" indent="0">
-              <a:buNone/>
-            </a:pPr>
-            <a:endParaRPr lang="en-US" dirty="0" smtClean="0"/>
-          </a:p>
-          <a:p>
-            <a:endParaRPr lang="en-US" dirty="0"/>
-          </a:p>
-        </p:txBody>
-      </p:sp>
-    </p:spTree>
-  </p:cSld>
-  <p:clrMapOvr>
-    <a:masterClrMapping/>
-  </p:clrMapOvr>
-</p:sld>
-</file>
-
-<file path=ppt/slides/slide13.xml><?xml version="1.0" encoding="utf-8"?>
-<p:sld xmlns:a="http://schemas.openxmlformats.org/drawingml/2006/main" xmlns:r="http://schemas.openxmlformats.org/officeDocument/2006/relationships" xmlns:p="http://schemas.openxmlformats.org/presentationml/2006/main">
-  <p:cSld>
-    <p:spTree>
-      <p:nvGrpSpPr>
-        <p:cNvPr id="1" name=""/>
-        <p:cNvGrpSpPr/>
-        <p:nvPr/>
-      </p:nvGrpSpPr>
-      <p:grpSpPr>
-        <a:xfrm>
-          <a:off x="0" y="0"/>
-          <a:ext cx="0" cy="0"/>
-          <a:chOff x="0" y="0"/>
-          <a:chExt cx="0" cy="0"/>
-        </a:xfrm>
-      </p:grpSpPr>
-      <p:sp>
-        <p:nvSpPr>
-          <p:cNvPr id="2" name="Title 1"/>
-          <p:cNvSpPr>
-            <a:spLocks noGrp="1"/>
-          </p:cNvSpPr>
-          <p:nvPr>
-            <p:ph type="title"/>
-          </p:nvPr>
-        </p:nvSpPr>
-        <p:spPr>
-          <a:xfrm>
-            <a:off x="1619794" y="0"/>
-            <a:ext cx="8878388" cy="731520"/>
-          </a:xfrm>
-        </p:spPr>
-        <p:txBody>
-          <a:bodyPr>
-            <a:normAutofit/>
-          </a:bodyPr>
-          <a:lstStyle/>
-          <a:p>
-            <a:r>
-              <a:rPr lang="en-US" sz="3600" dirty="0" smtClean="0"/>
-              <a:t>Milestone 2 Role Distribution</a:t>
-            </a:r>
-            <a:endParaRPr lang="en-US" sz="3600" dirty="0"/>
-          </a:p>
-        </p:txBody>
-      </p:sp>
-      <p:graphicFrame>
-        <p:nvGraphicFramePr>
-          <p:cNvPr id="4" name="Content Placeholder 3"/>
-          <p:cNvGraphicFramePr>
-            <a:graphicFrameLocks noGrp="1"/>
-          </p:cNvGraphicFramePr>
-          <p:nvPr>
-            <p:ph idx="1"/>
-            <p:extLst>
-              <p:ext uri="{D42A27DB-BD31-4B8C-83A1-F6EECF244321}">
-                <p14:modId xmlns:p14="http://schemas.microsoft.com/office/powerpoint/2010/main" val="3271794229"/>
-              </p:ext>
-            </p:extLst>
-          </p:nvPr>
-        </p:nvGraphicFramePr>
-        <p:xfrm>
-          <a:off x="361406" y="1892953"/>
-          <a:ext cx="11373395" cy="3307515"/>
-        </p:xfrm>
-        <a:graphic>
-          <a:graphicData uri="http://schemas.openxmlformats.org/drawingml/2006/table">
-            <a:tbl>
-              <a:tblPr firstRow="1" bandRow="1">
-                <a:tableStyleId>{5C22544A-7EE6-4342-B048-85BDC9FD1C3A}</a:tableStyleId>
-              </a:tblPr>
-              <a:tblGrid>
-                <a:gridCol w="2274679"/>
-                <a:gridCol w="2274679"/>
-                <a:gridCol w="2274679"/>
-                <a:gridCol w="2274679"/>
-                <a:gridCol w="2274679"/>
-              </a:tblGrid>
-              <a:tr h="1102505">
-                <a:tc>
-                  <a:txBody>
-                    <a:bodyPr/>
-                    <a:lstStyle/>
-                    <a:p>
-                      <a:r>
-                        <a:rPr lang="en-US" sz="2400" dirty="0" smtClean="0"/>
-                        <a:t>Task</a:t>
-                      </a:r>
-                      <a:endParaRPr lang="en-US" sz="2400" dirty="0"/>
-                    </a:p>
-                  </a:txBody>
-                  <a:tcPr/>
-                </a:tc>
-                <a:tc>
-                  <a:txBody>
-                    <a:bodyPr/>
-                    <a:lstStyle/>
-                    <a:p>
-                      <a:r>
-                        <a:rPr lang="en-US" sz="2400" dirty="0" smtClean="0"/>
-                        <a:t>Chad</a:t>
-                      </a:r>
-                      <a:endParaRPr lang="en-US" sz="2400" dirty="0"/>
-                    </a:p>
-                  </a:txBody>
-                  <a:tcPr/>
-                </a:tc>
-                <a:tc>
-                  <a:txBody>
-                    <a:bodyPr/>
-                    <a:lstStyle/>
-                    <a:p>
-                      <a:r>
-                        <a:rPr lang="en-US" sz="2400" dirty="0" smtClean="0"/>
-                        <a:t>Ken</a:t>
-                      </a:r>
-                      <a:endParaRPr lang="en-US" sz="2400" dirty="0"/>
-                    </a:p>
-                  </a:txBody>
-                  <a:tcPr/>
-                </a:tc>
-                <a:tc>
-                  <a:txBody>
-                    <a:bodyPr/>
-                    <a:lstStyle/>
-                    <a:p>
-                      <a:r>
-                        <a:rPr lang="en-US" sz="2400" dirty="0" smtClean="0"/>
-                        <a:t>Chris</a:t>
-                      </a:r>
-                      <a:endParaRPr lang="en-US" sz="2400" dirty="0"/>
-                    </a:p>
-                  </a:txBody>
-                  <a:tcPr/>
-                </a:tc>
-                <a:tc>
-                  <a:txBody>
-                    <a:bodyPr/>
-                    <a:lstStyle/>
-                    <a:p>
-                      <a:r>
-                        <a:rPr lang="en-US" sz="2400" dirty="0" smtClean="0"/>
-                        <a:t>Zach</a:t>
-                      </a:r>
-                      <a:endParaRPr lang="en-US" sz="2400" dirty="0"/>
-                    </a:p>
-                  </a:txBody>
-                  <a:tcPr/>
-                </a:tc>
-              </a:tr>
-              <a:tr h="1102505">
-                <a:tc>
-                  <a:txBody>
-                    <a:bodyPr/>
-                    <a:lstStyle/>
-                    <a:p>
-                      <a:pPr marL="0" marR="0" indent="0" algn="l" defTabSz="914400" rtl="0" eaLnBrk="1" fontAlgn="auto" latinLnBrk="0" hangingPunct="1">
-                        <a:lnSpc>
-                          <a:spcPct val="100000"/>
-                        </a:lnSpc>
-                        <a:spcBef>
-                          <a:spcPts val="0"/>
-                        </a:spcBef>
-                        <a:spcAft>
-                          <a:spcPts val="0"/>
-                        </a:spcAft>
-                        <a:buClrTx/>
-                        <a:buSzTx/>
-                        <a:buFontTx/>
-                        <a:buNone/>
-                        <a:tabLst/>
-                        <a:defRPr/>
-                      </a:pPr>
-                      <a:r>
-                        <a:rPr kumimoji="0" lang="en-US" sz="1400" kern="1200" dirty="0" smtClean="0">
-                          <a:solidFill>
-                            <a:schemeClr val="dk1"/>
-                          </a:solidFill>
-                          <a:latin typeface="+mn-lt"/>
-                          <a:ea typeface="+mn-ea"/>
-                          <a:cs typeface="+mn-cs"/>
-                        </a:rPr>
-                        <a:t> </a:t>
-                      </a:r>
-                      <a:endParaRPr kumimoji="0" lang="en-US" sz="1400" kern="1200" dirty="0" smtClean="0">
-                        <a:solidFill>
-                          <a:schemeClr val="dk1"/>
-                        </a:solidFill>
-                        <a:latin typeface="+mn-lt"/>
-                        <a:ea typeface="+mn-ea"/>
-                        <a:cs typeface="+mn-cs"/>
-                      </a:endParaRPr>
-                    </a:p>
-                    <a:p>
-                      <a:endParaRPr lang="en-US" dirty="0"/>
-                    </a:p>
-                  </a:txBody>
-                  <a:tcPr/>
-                </a:tc>
-                <a:tc>
-                  <a:txBody>
-                    <a:bodyPr/>
-                    <a:lstStyle/>
-                    <a:p>
-                      <a:pPr algn="ctr"/>
-                      <a:r>
-                        <a:rPr lang="en-US" dirty="0" smtClean="0"/>
-                        <a:t> </a:t>
-                      </a:r>
-                      <a:endParaRPr lang="en-US" dirty="0"/>
-                    </a:p>
-                  </a:txBody>
-                  <a:tcPr/>
-                </a:tc>
-                <a:tc>
-                  <a:txBody>
-                    <a:bodyPr/>
-                    <a:lstStyle/>
-                    <a:p>
-                      <a:pPr marL="0" marR="0" indent="0" algn="ctr" defTabSz="914400" rtl="0" eaLnBrk="1" fontAlgn="auto" latinLnBrk="0" hangingPunct="1">
-                        <a:lnSpc>
-                          <a:spcPct val="100000"/>
-                        </a:lnSpc>
-                        <a:spcBef>
-                          <a:spcPts val="0"/>
-                        </a:spcBef>
-                        <a:spcAft>
-                          <a:spcPts val="0"/>
-                        </a:spcAft>
-                        <a:buClrTx/>
-                        <a:buSzTx/>
-                        <a:buFontTx/>
-                        <a:buNone/>
-                        <a:tabLst/>
-                        <a:defRPr/>
-                      </a:pPr>
-                      <a:r>
-                        <a:rPr lang="en-US" dirty="0" smtClean="0"/>
-                        <a:t> </a:t>
-                      </a:r>
-                      <a:endParaRPr lang="en-US" dirty="0" smtClean="0"/>
-                    </a:p>
-                    <a:p>
-                      <a:pPr algn="ctr"/>
-                      <a:endParaRPr lang="en-US" dirty="0"/>
-                    </a:p>
-                  </a:txBody>
-                  <a:tcPr/>
-                </a:tc>
-                <a:tc>
-                  <a:txBody>
-                    <a:bodyPr/>
-                    <a:lstStyle/>
-                    <a:p>
-                      <a:pPr marL="0" marR="0" indent="0" algn="ctr" defTabSz="914400" rtl="0" eaLnBrk="1" fontAlgn="auto" latinLnBrk="0" hangingPunct="1">
-                        <a:lnSpc>
-                          <a:spcPct val="100000"/>
-                        </a:lnSpc>
-                        <a:spcBef>
-                          <a:spcPts val="0"/>
-                        </a:spcBef>
-                        <a:spcAft>
-                          <a:spcPts val="0"/>
-                        </a:spcAft>
-                        <a:buClrTx/>
-                        <a:buSzTx/>
-                        <a:buFontTx/>
-                        <a:buNone/>
-                        <a:tabLst/>
-                        <a:defRPr/>
-                      </a:pPr>
-                      <a:r>
-                        <a:rPr lang="en-US" dirty="0" smtClean="0"/>
-                        <a:t> </a:t>
-                      </a:r>
-                      <a:endParaRPr lang="en-US" dirty="0" smtClean="0"/>
-                    </a:p>
-                    <a:p>
-                      <a:pPr algn="ctr"/>
-                      <a:endParaRPr lang="en-US" dirty="0"/>
-                    </a:p>
-                  </a:txBody>
-                  <a:tcPr/>
-                </a:tc>
-                <a:tc>
-                  <a:txBody>
-                    <a:bodyPr/>
-                    <a:lstStyle/>
-                    <a:p>
-                      <a:pPr marL="0" marR="0" indent="0" algn="ctr" defTabSz="914400" rtl="0" eaLnBrk="1" fontAlgn="auto" latinLnBrk="0" hangingPunct="1">
-                        <a:lnSpc>
-                          <a:spcPct val="100000"/>
-                        </a:lnSpc>
-                        <a:spcBef>
-                          <a:spcPts val="0"/>
-                        </a:spcBef>
-                        <a:spcAft>
-                          <a:spcPts val="0"/>
-                        </a:spcAft>
-                        <a:buClrTx/>
-                        <a:buSzTx/>
-                        <a:buFontTx/>
-                        <a:buNone/>
-                        <a:tabLst/>
-                        <a:defRPr/>
-                      </a:pPr>
-                      <a:r>
-                        <a:rPr lang="en-US" dirty="0" smtClean="0"/>
-                        <a:t> </a:t>
-                      </a:r>
-                      <a:endParaRPr lang="en-US" dirty="0" smtClean="0"/>
-                    </a:p>
-                    <a:p>
-                      <a:pPr algn="ctr"/>
-                      <a:endParaRPr lang="en-US" dirty="0"/>
-                    </a:p>
-                  </a:txBody>
-                  <a:tcPr/>
-                </a:tc>
-              </a:tr>
-              <a:tr h="1102505">
-                <a:tc>
-                  <a:txBody>
-                    <a:bodyPr/>
-                    <a:lstStyle/>
-                    <a:p>
-                      <a:pPr marL="0" marR="0" indent="0" algn="l" defTabSz="914400" rtl="0" eaLnBrk="1" fontAlgn="auto" latinLnBrk="0" hangingPunct="1">
-                        <a:lnSpc>
-                          <a:spcPct val="100000"/>
-                        </a:lnSpc>
-                        <a:spcBef>
-                          <a:spcPts val="0"/>
-                        </a:spcBef>
-                        <a:spcAft>
-                          <a:spcPts val="0"/>
-                        </a:spcAft>
-                        <a:buClrTx/>
-                        <a:buSzTx/>
-                        <a:buFontTx/>
-                        <a:buNone/>
-                        <a:tabLst/>
-                        <a:defRPr/>
-                      </a:pPr>
-                      <a:r>
-                        <a:rPr kumimoji="0" lang="en-US" sz="1400" kern="1200" dirty="0" smtClean="0">
-                          <a:solidFill>
-                            <a:schemeClr val="dk1"/>
-                          </a:solidFill>
-                          <a:latin typeface="+mn-lt"/>
-                          <a:ea typeface="+mn-ea"/>
-                          <a:cs typeface="+mn-cs"/>
-                        </a:rPr>
-                        <a:t> </a:t>
-                      </a:r>
-                      <a:endParaRPr kumimoji="0" lang="en-US" sz="1400" kern="1200" dirty="0" smtClean="0">
-                        <a:solidFill>
-                          <a:schemeClr val="dk1"/>
-                        </a:solidFill>
-                        <a:latin typeface="+mn-lt"/>
-                        <a:ea typeface="+mn-ea"/>
-                        <a:cs typeface="+mn-cs"/>
-                      </a:endParaRPr>
-                    </a:p>
-                    <a:p>
-                      <a:endParaRPr lang="en-US" dirty="0"/>
-                    </a:p>
-                  </a:txBody>
-                  <a:tcPr/>
-                </a:tc>
-                <a:tc>
-                  <a:txBody>
-                    <a:bodyPr/>
-                    <a:lstStyle/>
-                    <a:p>
-                      <a:pPr marL="0" marR="0" indent="0" algn="ctr" defTabSz="914400" rtl="0" eaLnBrk="1" fontAlgn="auto" latinLnBrk="0" hangingPunct="1">
-                        <a:lnSpc>
-                          <a:spcPct val="100000"/>
-                        </a:lnSpc>
-                        <a:spcBef>
-                          <a:spcPts val="0"/>
-                        </a:spcBef>
-                        <a:spcAft>
-                          <a:spcPts val="0"/>
-                        </a:spcAft>
-                        <a:buClrTx/>
-                        <a:buSzTx/>
-                        <a:buFontTx/>
-                        <a:buNone/>
-                        <a:tabLst/>
-                        <a:defRPr/>
-                      </a:pPr>
-                      <a:r>
-                        <a:rPr lang="en-US" dirty="0" smtClean="0"/>
-                        <a:t> </a:t>
-                      </a:r>
-                      <a:endParaRPr lang="en-US" dirty="0"/>
-                    </a:p>
-                  </a:txBody>
-                  <a:tcPr/>
-                </a:tc>
-                <a:tc>
-                  <a:txBody>
-                    <a:bodyPr/>
-                    <a:lstStyle/>
-                    <a:p>
-                      <a:pPr marL="0" marR="0" indent="0" algn="ctr" defTabSz="914400" rtl="0" eaLnBrk="1" fontAlgn="auto" latinLnBrk="0" hangingPunct="1">
-                        <a:lnSpc>
-                          <a:spcPct val="100000"/>
-                        </a:lnSpc>
-                        <a:spcBef>
-                          <a:spcPts val="0"/>
-                        </a:spcBef>
-                        <a:spcAft>
-                          <a:spcPts val="0"/>
-                        </a:spcAft>
-                        <a:buClrTx/>
-                        <a:buSzTx/>
-                        <a:buFontTx/>
-                        <a:buNone/>
-                        <a:tabLst/>
-                        <a:defRPr/>
-                      </a:pPr>
-                      <a:r>
-                        <a:rPr lang="en-US" dirty="0" smtClean="0"/>
-                        <a:t> </a:t>
-                      </a:r>
-                      <a:endParaRPr lang="en-US" dirty="0" smtClean="0"/>
-                    </a:p>
-                    <a:p>
-                      <a:pPr algn="ctr"/>
-                      <a:endParaRPr lang="en-US" dirty="0"/>
-                    </a:p>
-                  </a:txBody>
-                  <a:tcPr/>
-                </a:tc>
-                <a:tc>
-                  <a:txBody>
-                    <a:bodyPr/>
-                    <a:lstStyle/>
-                    <a:p>
-                      <a:pPr marL="0" marR="0" indent="0" algn="ctr" defTabSz="914400" rtl="0" eaLnBrk="1" fontAlgn="auto" latinLnBrk="0" hangingPunct="1">
-                        <a:lnSpc>
-                          <a:spcPct val="100000"/>
-                        </a:lnSpc>
-                        <a:spcBef>
-                          <a:spcPts val="0"/>
-                        </a:spcBef>
-                        <a:spcAft>
-                          <a:spcPts val="0"/>
-                        </a:spcAft>
-                        <a:buClrTx/>
-                        <a:buSzTx/>
-                        <a:buFontTx/>
-                        <a:buNone/>
-                        <a:tabLst/>
-                        <a:defRPr/>
-                      </a:pPr>
-                      <a:r>
-                        <a:rPr lang="en-US" dirty="0" smtClean="0"/>
-                        <a:t> </a:t>
-                      </a:r>
-                      <a:endParaRPr lang="en-US" dirty="0" smtClean="0"/>
-                    </a:p>
-                    <a:p>
-                      <a:pPr algn="ctr"/>
-                      <a:endParaRPr lang="en-US" dirty="0"/>
-                    </a:p>
-                  </a:txBody>
-                  <a:tcPr/>
-                </a:tc>
-                <a:tc>
-                  <a:txBody>
-                    <a:bodyPr/>
-                    <a:lstStyle/>
-                    <a:p>
-                      <a:pPr marL="0" marR="0" indent="0" algn="ctr" defTabSz="914400" rtl="0" eaLnBrk="1" fontAlgn="auto" latinLnBrk="0" hangingPunct="1">
-                        <a:lnSpc>
-                          <a:spcPct val="100000"/>
-                        </a:lnSpc>
-                        <a:spcBef>
-                          <a:spcPts val="0"/>
-                        </a:spcBef>
-                        <a:spcAft>
-                          <a:spcPts val="0"/>
-                        </a:spcAft>
-                        <a:buClrTx/>
-                        <a:buSzTx/>
-                        <a:buFontTx/>
-                        <a:buNone/>
-                        <a:tabLst/>
-                        <a:defRPr/>
-                      </a:pPr>
-                      <a:r>
-                        <a:rPr lang="en-US" dirty="0" smtClean="0"/>
-                        <a:t> </a:t>
-                      </a:r>
-                      <a:endParaRPr lang="en-US" dirty="0" smtClean="0"/>
-                    </a:p>
-                    <a:p>
-                      <a:pPr algn="ctr"/>
-                      <a:endParaRPr lang="en-US" dirty="0"/>
-                    </a:p>
-                  </a:txBody>
-                  <a:tcPr/>
-                </a:tc>
-              </a:tr>
-            </a:tbl>
-          </a:graphicData>
-        </a:graphic>
-      </p:graphicFrame>
-    </p:spTree>
-  </p:cSld>
-  <p:clrMapOvr>
-    <a:masterClrMapping/>
-  </p:clrMapOvr>
-</p:sld>
-</file>
-
-<file path=ppt/slides/slide14.xml><?xml version="1.0" encoding="utf-8"?>
-<p:sld xmlns:a="http://schemas.openxmlformats.org/drawingml/2006/main" xmlns:r="http://schemas.openxmlformats.org/officeDocument/2006/relationships" xmlns:p="http://schemas.openxmlformats.org/presentationml/2006/main">
-  <p:cSld>
-    <p:spTree>
-      <p:nvGrpSpPr>
-        <p:cNvPr id="1" name=""/>
-        <p:cNvGrpSpPr/>
-        <p:nvPr/>
-      </p:nvGrpSpPr>
-      <p:grpSpPr>
-        <a:xfrm>
-          <a:off x="0" y="0"/>
-          <a:ext cx="0" cy="0"/>
-          <a:chOff x="0" y="0"/>
-          <a:chExt cx="0" cy="0"/>
-        </a:xfrm>
-      </p:grpSpPr>
-      <p:pic>
-        <p:nvPicPr>
-          <p:cNvPr id="6" name="Content Placeholder 5" descr="getrains3.jpg"/>
-          <p:cNvPicPr>
-            <a:picLocks noGrp="1" noChangeAspect="1"/>
-          </p:cNvPicPr>
-          <p:nvPr>
-            <p:ph idx="1"/>
-          </p:nvPr>
-        </p:nvPicPr>
-        <p:blipFill>
-          <a:blip r:embed="rId2" cstate="print"/>
-          <a:stretch>
-            <a:fillRect/>
-          </a:stretch>
-        </p:blipFill>
-        <p:spPr>
-          <a:xfrm>
-            <a:off x="22706" y="5871"/>
-            <a:ext cx="12169294" cy="6794471"/>
-          </a:xfrm>
-        </p:spPr>
-      </p:pic>
-      <p:sp>
-        <p:nvSpPr>
-          <p:cNvPr id="7" name="TextBox 6"/>
-          <p:cNvSpPr txBox="1"/>
-          <p:nvPr/>
-        </p:nvSpPr>
-        <p:spPr>
-          <a:xfrm>
-            <a:off x="169818" y="195943"/>
-            <a:ext cx="5081840" cy="923330"/>
-          </a:xfrm>
-          <a:prstGeom prst="rect">
-            <a:avLst/>
-          </a:prstGeom>
-          <a:noFill/>
-        </p:spPr>
-        <p:txBody>
-          <a:bodyPr wrap="none" rtlCol="0">
-            <a:spAutoFit/>
-          </a:bodyPr>
-          <a:lstStyle/>
-          <a:p>
-            <a:r>
-              <a:rPr lang="en-US" sz="5400" dirty="0" smtClean="0">
-                <a:solidFill>
-                  <a:schemeClr val="bg1"/>
-                </a:solidFill>
-              </a:rPr>
-              <a:t>Any Questions?</a:t>
-            </a:r>
-            <a:endParaRPr lang="en-US" sz="5400" dirty="0">
-              <a:solidFill>
-                <a:schemeClr val="bg1"/>
-              </a:solidFill>
-            </a:endParaRPr>
-          </a:p>
-        </p:txBody>
-      </p:sp>
-    </p:spTree>
   </p:cSld>
   <p:clrMapOvr>
     <a:masterClrMapping/>
@@ -4191,7 +3299,7 @@
             <p:ph idx="1"/>
             <p:extLst>
               <p:ext uri="{D42A27DB-BD31-4B8C-83A1-F6EECF244321}">
-                <p14:modId xmlns:p14="http://schemas.microsoft.com/office/powerpoint/2010/main" val="1064850087"/>
+                <p14:modId xmlns="" xmlns:p14="http://schemas.microsoft.com/office/powerpoint/2010/main" val="1064850087"/>
               </p:ext>
             </p:extLst>
           </p:nvPr>
@@ -4476,37 +3584,16 @@
                         </a:rPr>
                         <a:t> </a:t>
                       </a:r>
-                      <a:endParaRPr lang="en-US" sz="1400" dirty="0">
-                        <a:effectLst/>
-                        <a:latin typeface="Calibri" panose="020F0502020204030204" pitchFamily="34" charset="0"/>
-                        <a:ea typeface="Calibri" panose="020F0502020204030204" pitchFamily="34" charset="0"/>
-                        <a:cs typeface="Times New Roman" panose="02020603050405020304" pitchFamily="18" charset="0"/>
-                      </a:endParaRPr>
-                    </a:p>
-                  </a:txBody>
-                  <a:tcPr marL="68580" marR="68580" marT="0" marB="0"/>
-                </a:tc>
-                <a:tc>
-                  <a:txBody>
-                    <a:bodyPr/>
-                    <a:lstStyle/>
-                    <a:p>
-                      <a:pPr marL="0" marR="0" algn="ctr">
-                        <a:lnSpc>
-                          <a:spcPct val="115000"/>
-                        </a:lnSpc>
-                        <a:spcBef>
-                          <a:spcPts val="0"/>
-                        </a:spcBef>
-                        <a:spcAft>
-                          <a:spcPts val="0"/>
-                        </a:spcAft>
-                      </a:pPr>
                       <a:r>
-                        <a:rPr lang="en-US" sz="1400" dirty="0" smtClean="0">
-                          <a:effectLst/>
+                        <a:rPr kumimoji="0" lang="en-US" sz="1800" b="1" kern="1200" dirty="0" smtClean="0">
+                          <a:solidFill>
+                            <a:schemeClr val="lt1"/>
+                          </a:solidFill>
+                          <a:latin typeface="+mn-lt"/>
+                          <a:ea typeface="+mn-ea"/>
+                          <a:cs typeface="+mn-cs"/>
                         </a:rPr>
-                        <a:t> </a:t>
+                        <a:t>Parsing the Database</a:t>
                       </a:r>
                       <a:endParaRPr lang="en-US" sz="1400" dirty="0">
                         <a:effectLst/>
@@ -4540,37 +3627,16 @@
                         </a:rPr>
                         <a:t> </a:t>
                       </a:r>
-                      <a:endParaRPr lang="en-US" sz="1400" dirty="0">
-                        <a:effectLst/>
-                        <a:latin typeface="Calibri" panose="020F0502020204030204" pitchFamily="34" charset="0"/>
-                        <a:ea typeface="Calibri" panose="020F0502020204030204" pitchFamily="34" charset="0"/>
-                        <a:cs typeface="Times New Roman" panose="02020603050405020304" pitchFamily="18" charset="0"/>
-                      </a:endParaRPr>
-                    </a:p>
-                  </a:txBody>
-                  <a:tcPr marL="68580" marR="68580" marT="0" marB="0"/>
-                </a:tc>
-                <a:tc>
-                  <a:txBody>
-                    <a:bodyPr/>
-                    <a:lstStyle/>
-                    <a:p>
-                      <a:pPr marL="0" marR="0" algn="ctr">
-                        <a:lnSpc>
-                          <a:spcPct val="115000"/>
-                        </a:lnSpc>
-                        <a:spcBef>
-                          <a:spcPts val="0"/>
-                        </a:spcBef>
-                        <a:spcAft>
-                          <a:spcPts val="0"/>
-                        </a:spcAft>
-                      </a:pPr>
                       <a:r>
-                        <a:rPr lang="en-US" sz="1400" dirty="0" smtClean="0">
-                          <a:effectLst/>
+                        <a:rPr kumimoji="0" lang="en-US" sz="1800" kern="1200" dirty="0" smtClean="0">
+                          <a:solidFill>
+                            <a:schemeClr val="dk1"/>
+                          </a:solidFill>
+                          <a:latin typeface="+mn-lt"/>
+                          <a:ea typeface="+mn-ea"/>
+                          <a:cs typeface="+mn-cs"/>
                         </a:rPr>
-                        <a:t> </a:t>
+                        <a:t>100%</a:t>
                       </a:r>
                       <a:endParaRPr lang="en-US" sz="1400" dirty="0">
                         <a:effectLst/>
@@ -4601,11 +3667,8 @@
                       <a:r>
                         <a:rPr lang="en-US" sz="1400" dirty="0" smtClean="0">
                           <a:effectLst/>
-                          <a:latin typeface="+mn-lt"/>
-                          <a:ea typeface="+mn-ea"/>
-                          <a:cs typeface="+mn-cs"/>
                         </a:rPr>
-                        <a:t> </a:t>
+                        <a:t> 0%</a:t>
                       </a:r>
                       <a:endParaRPr lang="en-US" sz="1400" dirty="0">
                         <a:effectLst/>
@@ -4636,11 +3699,78 @@
                       <a:r>
                         <a:rPr lang="en-US" sz="1400" dirty="0" smtClean="0">
                           <a:effectLst/>
+                        </a:rPr>
+                        <a:t>50%</a:t>
+                      </a:r>
+                      <a:endParaRPr lang="en-US" sz="1400" dirty="0">
+                        <a:effectLst/>
+                        <a:latin typeface="Calibri" panose="020F0502020204030204" pitchFamily="34" charset="0"/>
+                        <a:ea typeface="Calibri" panose="020F0502020204030204" pitchFamily="34" charset="0"/>
+                        <a:cs typeface="Times New Roman" panose="02020603050405020304" pitchFamily="18" charset="0"/>
+                      </a:endParaRPr>
+                    </a:p>
+                  </a:txBody>
+                  <a:tcPr marL="68580" marR="68580" marT="0" marB="0"/>
+                </a:tc>
+                <a:tc>
+                  <a:txBody>
+                    <a:bodyPr/>
+                    <a:lstStyle/>
+                    <a:p>
+                      <a:pPr marL="0" marR="0" algn="ctr">
+                        <a:lnSpc>
+                          <a:spcPct val="115000"/>
+                        </a:lnSpc>
+                        <a:spcBef>
+                          <a:spcPts val="0"/>
+                        </a:spcBef>
+                        <a:spcAft>
+                          <a:spcPts val="0"/>
+                        </a:spcAft>
+                      </a:pPr>
+                      <a:r>
+                        <a:rPr lang="en-US" sz="1400" dirty="0" smtClean="0">
+                          <a:effectLst/>
                           <a:latin typeface="+mn-lt"/>
                           <a:ea typeface="+mn-ea"/>
                           <a:cs typeface="+mn-cs"/>
                         </a:rPr>
-                        <a:t> </a:t>
+                        <a:t>50%</a:t>
+                      </a:r>
+                      <a:endParaRPr lang="en-US" sz="1400" dirty="0">
+                        <a:effectLst/>
+                        <a:latin typeface="Calibri" panose="020F0502020204030204" pitchFamily="34" charset="0"/>
+                        <a:ea typeface="Calibri" panose="020F0502020204030204" pitchFamily="34" charset="0"/>
+                        <a:cs typeface="Times New Roman" panose="02020603050405020304" pitchFamily="18" charset="0"/>
+                      </a:endParaRPr>
+                    </a:p>
+                  </a:txBody>
+                  <a:tcPr marL="68580" marR="68580" marT="0" marB="0"/>
+                </a:tc>
+                <a:tc>
+                  <a:txBody>
+                    <a:bodyPr/>
+                    <a:lstStyle/>
+                    <a:p>
+                      <a:pPr marL="0" marR="0" algn="ctr">
+                        <a:lnSpc>
+                          <a:spcPct val="115000"/>
+                        </a:lnSpc>
+                        <a:spcBef>
+                          <a:spcPts val="0"/>
+                        </a:spcBef>
+                        <a:spcAft>
+                          <a:spcPts val="0"/>
+                        </a:spcAft>
+                      </a:pPr>
+                      <a:r>
+                        <a:rPr lang="en-US" sz="1400" dirty="0" smtClean="0">
+                          <a:effectLst/>
+                          <a:latin typeface="+mn-lt"/>
+                          <a:ea typeface="+mn-ea"/>
+                          <a:cs typeface="+mn-cs"/>
+                        </a:rPr>
+                        <a:t>0%</a:t>
                       </a:r>
                       <a:endParaRPr lang="en-US" sz="1400" dirty="0">
                         <a:effectLst/>
@@ -4717,37 +3847,16 @@
                         </a:rPr>
                         <a:t> </a:t>
                       </a:r>
-                      <a:endParaRPr lang="en-US" sz="1400" dirty="0">
-                        <a:effectLst/>
-                        <a:latin typeface="Calibri" panose="020F0502020204030204" pitchFamily="34" charset="0"/>
-                        <a:ea typeface="Calibri" panose="020F0502020204030204" pitchFamily="34" charset="0"/>
-                        <a:cs typeface="Times New Roman" panose="02020603050405020304" pitchFamily="18" charset="0"/>
-                      </a:endParaRPr>
-                    </a:p>
-                  </a:txBody>
-                  <a:tcPr marL="68580" marR="68580" marT="0" marB="0"/>
-                </a:tc>
-                <a:tc>
-                  <a:txBody>
-                    <a:bodyPr/>
-                    <a:lstStyle/>
-                    <a:p>
-                      <a:pPr marL="0" marR="0" algn="ctr">
-                        <a:lnSpc>
-                          <a:spcPct val="115000"/>
-                        </a:lnSpc>
-                        <a:spcBef>
-                          <a:spcPts val="0"/>
-                        </a:spcBef>
-                        <a:spcAft>
-                          <a:spcPts val="0"/>
-                        </a:spcAft>
-                      </a:pPr>
                       <a:r>
-                        <a:rPr lang="en-US" sz="1400" dirty="0" smtClean="0">
-                          <a:effectLst/>
+                        <a:rPr kumimoji="0" lang="en-US" sz="1800" b="1" kern="1200" dirty="0" smtClean="0">
+                          <a:solidFill>
+                            <a:schemeClr val="lt1"/>
+                          </a:solidFill>
+                          <a:latin typeface="+mn-lt"/>
+                          <a:ea typeface="+mn-ea"/>
+                          <a:cs typeface="+mn-cs"/>
                         </a:rPr>
-                        <a:t> </a:t>
+                        <a:t>Do a GUI Mockup and Present to GE</a:t>
                       </a:r>
                       <a:endParaRPr lang="en-US" sz="1400" dirty="0">
                         <a:effectLst/>
@@ -4778,11 +3887,8 @@
                       <a:r>
                         <a:rPr lang="en-US" sz="1400" dirty="0" smtClean="0">
                           <a:effectLst/>
-                          <a:latin typeface="+mn-lt"/>
-                          <a:ea typeface="+mn-ea"/>
-                          <a:cs typeface="+mn-cs"/>
                         </a:rPr>
-                        <a:t> </a:t>
+                        <a:t>100% </a:t>
                       </a:r>
                       <a:endParaRPr lang="en-US" sz="1400" dirty="0">
                         <a:effectLst/>
@@ -4817,7 +3923,7 @@
                           <a:ea typeface="+mn-ea"/>
                           <a:cs typeface="+mn-cs"/>
                         </a:rPr>
-                        <a:t> </a:t>
+                        <a:t>50%</a:t>
                       </a:r>
                       <a:endParaRPr lang="en-US" sz="1400" dirty="0">
                         <a:effectLst/>
@@ -4852,7 +3958,7 @@
                           <a:ea typeface="+mn-ea"/>
                           <a:cs typeface="+mn-cs"/>
                         </a:rPr>
-                        <a:t> </a:t>
+                        <a:t>0% </a:t>
                       </a:r>
                       <a:endParaRPr lang="en-US" sz="1400" dirty="0">
                         <a:effectLst/>
@@ -4887,7 +3993,42 @@
                           <a:ea typeface="+mn-ea"/>
                           <a:cs typeface="+mn-cs"/>
                         </a:rPr>
-                        <a:t> </a:t>
+                        <a:t>0%</a:t>
+                      </a:r>
+                      <a:endParaRPr lang="en-US" sz="1400" dirty="0">
+                        <a:effectLst/>
+                        <a:latin typeface="Calibri" panose="020F0502020204030204" pitchFamily="34" charset="0"/>
+                        <a:ea typeface="Calibri" panose="020F0502020204030204" pitchFamily="34" charset="0"/>
+                        <a:cs typeface="Times New Roman" panose="02020603050405020304" pitchFamily="18" charset="0"/>
+                      </a:endParaRPr>
+                    </a:p>
+                  </a:txBody>
+                  <a:tcPr marL="68580" marR="68580" marT="0" marB="0"/>
+                </a:tc>
+                <a:tc>
+                  <a:txBody>
+                    <a:bodyPr/>
+                    <a:lstStyle/>
+                    <a:p>
+                      <a:pPr marL="0" marR="0" algn="ctr">
+                        <a:lnSpc>
+                          <a:spcPct val="115000"/>
+                        </a:lnSpc>
+                        <a:spcBef>
+                          <a:spcPts val="0"/>
+                        </a:spcBef>
+                        <a:spcAft>
+                          <a:spcPts val="0"/>
+                        </a:spcAft>
+                      </a:pPr>
+                      <a:r>
+                        <a:rPr lang="en-US" sz="1400" dirty="0" smtClean="0">
+                          <a:effectLst/>
+                          <a:latin typeface="+mn-lt"/>
+                          <a:ea typeface="+mn-ea"/>
+                          <a:cs typeface="+mn-cs"/>
+                        </a:rPr>
+                        <a:t>50%</a:t>
                       </a:r>
                       <a:endParaRPr lang="en-US" sz="1400" dirty="0">
                         <a:effectLst/>
@@ -4942,7 +4083,7 @@
     </p:spTree>
     <p:extLst>
       <p:ext uri="{BB962C8B-B14F-4D97-AF65-F5344CB8AC3E}">
-        <p14:creationId xmlns:p14="http://schemas.microsoft.com/office/powerpoint/2010/main" val="4270080904"/>
+        <p14:creationId xmlns="" xmlns:p14="http://schemas.microsoft.com/office/powerpoint/2010/main" val="4270080904"/>
       </p:ext>
     </p:extLst>
   </p:cSld>
@@ -4986,15 +4127,7 @@
           <a:p>
             <a:r>
               <a:rPr lang="en-US" dirty="0" smtClean="0"/>
-              <a:t>Milestone </a:t>
-            </a:r>
-            <a:r>
-              <a:rPr lang="en-US" dirty="0" smtClean="0"/>
-              <a:t>2 </a:t>
-            </a:r>
-            <a:r>
-              <a:rPr lang="en-US" dirty="0" smtClean="0"/>
-              <a:t>Accomplishment Summary</a:t>
+              <a:t>Milestone 2 Accomplishment Summary</a:t>
             </a:r>
             <a:endParaRPr lang="en-US" dirty="0"/>
           </a:p>
@@ -5003,7 +4136,7 @@
     </p:spTree>
     <p:extLst>
       <p:ext uri="{BB962C8B-B14F-4D97-AF65-F5344CB8AC3E}">
-        <p14:creationId xmlns:p14="http://schemas.microsoft.com/office/powerpoint/2010/main" val="4270080904"/>
+        <p14:creationId xmlns="" xmlns:p14="http://schemas.microsoft.com/office/powerpoint/2010/main" val="4270080904"/>
       </p:ext>
     </p:extLst>
   </p:cSld>
@@ -5046,8 +4179,8 @@
           <a:lstStyle/>
           <a:p>
             <a:r>
-              <a:rPr lang="en-US" u="sng" dirty="0" smtClean="0"/>
-              <a:t>Obtain Requirement Document From GE</a:t>
+              <a:rPr lang="en-US" sz="4400" u="sng" dirty="0" smtClean="0"/>
+              <a:t>Parsing the Database</a:t>
             </a:r>
             <a:endParaRPr lang="en-US" dirty="0"/>
           </a:p>
@@ -5079,10 +4212,41 @@
               <a:rPr lang="en-US" sz="2800" dirty="0" smtClean="0"/>
               <a:t> </a:t>
             </a:r>
+          </a:p>
+          <a:p>
             <a:endParaRPr lang="en-US" sz="2800" dirty="0" smtClean="0"/>
           </a:p>
           <a:p>
-            <a:endParaRPr lang="en-US" sz="2800" dirty="0" smtClean="0"/>
+            <a:endParaRPr lang="en-US" dirty="0"/>
+          </a:p>
+        </p:txBody>
+      </p:sp>
+      <p:sp>
+        <p:nvSpPr>
+          <p:cNvPr id="5" name="TextBox 4"/>
+          <p:cNvSpPr txBox="1"/>
+          <p:nvPr/>
+        </p:nvSpPr>
+        <p:spPr>
+          <a:xfrm>
+            <a:off x="613954" y="1554479"/>
+            <a:ext cx="10896729" cy="2339102"/>
+          </a:xfrm>
+          <a:prstGeom prst="rect">
+            <a:avLst/>
+          </a:prstGeom>
+          <a:noFill/>
+        </p:spPr>
+        <p:txBody>
+          <a:bodyPr wrap="square" rtlCol="0">
+            <a:spAutoFit/>
+          </a:bodyPr>
+          <a:lstStyle/>
+          <a:p>
+            <a:r>
+              <a:rPr lang="en-US" sz="3200" dirty="0" smtClean="0"/>
+              <a:t>Take our skeleton infrastructure of a database and add to it the functionality of information retrieval. Set it up so that the user can enter query commands and actually retrieve information stored in the database.</a:t>
+            </a:r>
           </a:p>
           <a:p>
             <a:endParaRPr lang="en-US" dirty="0"/>
@@ -5092,7 +4256,7 @@
     </p:spTree>
     <p:extLst>
       <p:ext uri="{BB962C8B-B14F-4D97-AF65-F5344CB8AC3E}">
-        <p14:creationId xmlns:p14="http://schemas.microsoft.com/office/powerpoint/2010/main" val="4270080904"/>
+        <p14:creationId xmlns="" xmlns:p14="http://schemas.microsoft.com/office/powerpoint/2010/main" val="4270080904"/>
       </p:ext>
     </p:extLst>
   </p:cSld>
@@ -5131,12 +4295,14 @@
         </p:nvSpPr>
         <p:spPr/>
         <p:txBody>
-          <a:bodyPr/>
-          <a:lstStyle/>
-          <a:p>
-            <a:r>
-              <a:rPr lang="en-US" dirty="0" smtClean="0"/>
-              <a:t>Requirements</a:t>
+          <a:bodyPr>
+            <a:normAutofit/>
+          </a:bodyPr>
+          <a:lstStyle/>
+          <a:p>
+            <a:r>
+              <a:rPr lang="en-US" sz="4400" u="sng" dirty="0" smtClean="0"/>
+              <a:t>Do a GUI Mockup and Present to GE</a:t>
             </a:r>
             <a:endParaRPr lang="en-US" dirty="0"/>
           </a:p>
@@ -5144,29 +4310,72 @@
       </p:sp>
       <p:sp>
         <p:nvSpPr>
-          <p:cNvPr id="3" name="Content Placeholder 2"/>
-          <p:cNvSpPr>
-            <a:spLocks noGrp="1"/>
-          </p:cNvSpPr>
-          <p:nvPr>
-            <p:ph idx="1"/>
-          </p:nvPr>
-        </p:nvSpPr>
-        <p:spPr/>
-        <p:txBody>
-          <a:bodyPr/>
-          <a:lstStyle/>
-          <a:p>
-            <a:r>
-              <a:rPr lang="en-US" dirty="0" smtClean="0"/>
+          <p:cNvPr id="5" name="TextBox 4"/>
+          <p:cNvSpPr txBox="1"/>
+          <p:nvPr/>
+        </p:nvSpPr>
+        <p:spPr>
+          <a:xfrm>
+            <a:off x="595085" y="1785258"/>
+            <a:ext cx="10892413" cy="738664"/>
+          </a:xfrm>
+          <a:prstGeom prst="rect">
+            <a:avLst/>
+          </a:prstGeom>
+          <a:noFill/>
+        </p:spPr>
+        <p:txBody>
+          <a:bodyPr wrap="square" rtlCol="0">
+            <a:spAutoFit/>
+          </a:bodyPr>
+          <a:lstStyle/>
+          <a:p>
+            <a:r>
+              <a:rPr lang="en-US" sz="2400" dirty="0" smtClean="0"/>
               <a:t> </a:t>
             </a:r>
-            <a:endParaRPr lang="en-US" dirty="0" smtClean="0"/>
-          </a:p>
-          <a:p>
-            <a:pPr marL="137160" indent="0">
-              <a:buNone/>
-            </a:pPr>
+          </a:p>
+          <a:p>
+            <a:endParaRPr lang="en-US" dirty="0"/>
+          </a:p>
+        </p:txBody>
+      </p:sp>
+      <p:sp>
+        <p:nvSpPr>
+          <p:cNvPr id="4" name="TextBox 3"/>
+          <p:cNvSpPr txBox="1"/>
+          <p:nvPr/>
+        </p:nvSpPr>
+        <p:spPr>
+          <a:xfrm>
+            <a:off x="391885" y="1489165"/>
+            <a:ext cx="11325497" cy="2339102"/>
+          </a:xfrm>
+          <a:prstGeom prst="rect">
+            <a:avLst/>
+          </a:prstGeom>
+          <a:noFill/>
+        </p:spPr>
+        <p:txBody>
+          <a:bodyPr wrap="square" rtlCol="0">
+            <a:spAutoFit/>
+          </a:bodyPr>
+          <a:lstStyle/>
+          <a:p>
+            <a:r>
+              <a:rPr lang="en-US" sz="3200" dirty="0" smtClean="0"/>
+              <a:t>Take our design documents of our GUI that we created in Photoshop and implement it into C# code. After completing the implementation, we will present it to Dan </a:t>
+            </a:r>
+            <a:r>
+              <a:rPr lang="en-US" sz="3200" dirty="0" err="1" smtClean="0"/>
+              <a:t>Ballesty</a:t>
+            </a:r>
+            <a:r>
+              <a:rPr lang="en-US" sz="3200" dirty="0" smtClean="0"/>
+              <a:t> for review and critique.</a:t>
+            </a:r>
+          </a:p>
+          <a:p>
             <a:endParaRPr lang="en-US" dirty="0"/>
           </a:p>
         </p:txBody>
@@ -5174,7 +4383,7 @@
     </p:spTree>
     <p:extLst>
       <p:ext uri="{BB962C8B-B14F-4D97-AF65-F5344CB8AC3E}">
-        <p14:creationId xmlns:p14="http://schemas.microsoft.com/office/powerpoint/2010/main" val="207691532"/>
+        <p14:creationId xmlns="" xmlns:p14="http://schemas.microsoft.com/office/powerpoint/2010/main" val="4270080904"/>
       </p:ext>
     </p:extLst>
   </p:cSld>
@@ -5216,41 +4425,75 @@
           <a:bodyPr/>
           <a:lstStyle/>
           <a:p>
-            <a:r>
-              <a:rPr lang="en-US" dirty="0" smtClean="0"/>
-              <a:t>Requirements</a:t>
-            </a:r>
-            <a:endParaRPr lang="en-US" dirty="0"/>
-          </a:p>
-        </p:txBody>
-      </p:sp>
-      <p:sp>
-        <p:nvSpPr>
-          <p:cNvPr id="3" name="Content Placeholder 2"/>
-          <p:cNvSpPr>
-            <a:spLocks noGrp="1"/>
-          </p:cNvSpPr>
+            <a:endParaRPr lang="en-US"/>
+          </a:p>
+        </p:txBody>
+      </p:sp>
+      <p:pic>
+        <p:nvPicPr>
+          <p:cNvPr id="4" name="Content Placeholder 3" descr="gegreenmachine.jpg"/>
+          <p:cNvPicPr>
+            <a:picLocks noGrp="1" noChangeAspect="1"/>
+          </p:cNvPicPr>
           <p:nvPr>
             <p:ph idx="1"/>
           </p:nvPr>
-        </p:nvSpPr>
-        <p:spPr/>
-        <p:txBody>
-          <a:bodyPr/>
-          <a:lstStyle/>
-          <a:p>
-            <a:r>
-              <a:rPr lang="en-US" dirty="0" smtClean="0"/>
-              <a:t> </a:t>
-            </a:r>
-            <a:endParaRPr lang="en-US" dirty="0" smtClean="0"/>
+        </p:nvPicPr>
+        <p:blipFill>
+          <a:blip r:embed="rId2" cstate="print"/>
+          <a:stretch>
+            <a:fillRect/>
+          </a:stretch>
+        </p:blipFill>
+        <p:spPr>
+          <a:xfrm>
+            <a:off x="0" y="1416"/>
+            <a:ext cx="12192000" cy="6856584"/>
+          </a:xfrm>
+        </p:spPr>
+      </p:pic>
+      <p:sp>
+        <p:nvSpPr>
+          <p:cNvPr id="5" name="TextBox 4"/>
+          <p:cNvSpPr txBox="1"/>
+          <p:nvPr/>
+        </p:nvSpPr>
+        <p:spPr>
+          <a:xfrm>
+            <a:off x="6791233" y="190137"/>
+            <a:ext cx="4871847" cy="923330"/>
+          </a:xfrm>
+          <a:prstGeom prst="rect">
+            <a:avLst/>
+          </a:prstGeom>
+          <a:noFill/>
+        </p:spPr>
+        <p:txBody>
+          <a:bodyPr wrap="none" rtlCol="0">
+            <a:spAutoFit/>
+          </a:bodyPr>
+          <a:lstStyle/>
+          <a:p>
+            <a:r>
+              <a:rPr lang="en-US" sz="5400" smtClean="0">
+                <a:solidFill>
+                  <a:schemeClr val="bg1"/>
+                </a:solidFill>
+              </a:rPr>
+              <a:t>Next Milestone</a:t>
+            </a:r>
+            <a:endParaRPr lang="en-US" sz="5400" dirty="0">
+              <a:solidFill>
+                <a:schemeClr val="bg1"/>
+              </a:solidFill>
+            </a:endParaRPr>
           </a:p>
         </p:txBody>
       </p:sp>
     </p:spTree>
     <p:extLst>
       <p:ext uri="{BB962C8B-B14F-4D97-AF65-F5344CB8AC3E}">
-        <p14:creationId xmlns:p14="http://schemas.microsoft.com/office/powerpoint/2010/main" val="2891250505"/>
+        <p14:creationId xmlns="" xmlns:p14="http://schemas.microsoft.com/office/powerpoint/2010/main" val="1202250340"/>
       </p:ext>
     </p:extLst>
   </p:cSld>
@@ -5289,48 +4532,18 @@
         </p:nvSpPr>
         <p:spPr/>
         <p:txBody>
-          <a:bodyPr>
-            <a:normAutofit/>
-          </a:bodyPr>
+          <a:bodyPr/>
           <a:lstStyle/>
           <a:p>
             <a:r>
               <a:rPr lang="en-US" dirty="0" smtClean="0"/>
-              <a:t>Test Plan</a:t>
+              <a:t>Milestone 3</a:t>
             </a:r>
             <a:endParaRPr lang="en-US" dirty="0"/>
           </a:p>
         </p:txBody>
       </p:sp>
-      <p:sp>
-        <p:nvSpPr>
-          <p:cNvPr id="3" name="Content Placeholder 2"/>
-          <p:cNvSpPr>
-            <a:spLocks noGrp="1"/>
-          </p:cNvSpPr>
-          <p:nvPr>
-            <p:ph idx="1"/>
-          </p:nvPr>
-        </p:nvSpPr>
-        <p:spPr/>
-        <p:txBody>
-          <a:bodyPr/>
-          <a:lstStyle/>
-          <a:p>
-            <a:r>
-              <a:rPr lang="en-US" dirty="0" smtClean="0"/>
-              <a:t> </a:t>
-            </a:r>
-            <a:endParaRPr lang="en-US" dirty="0"/>
-          </a:p>
-        </p:txBody>
-      </p:sp>
     </p:spTree>
-    <p:extLst>
-      <p:ext uri="{BB962C8B-B14F-4D97-AF65-F5344CB8AC3E}">
-        <p14:creationId xmlns:p14="http://schemas.microsoft.com/office/powerpoint/2010/main" val="3042954688"/>
-      </p:ext>
-    </p:extLst>
   </p:cSld>
   <p:clrMapOvr>
     <a:masterClrMapping/>
@@ -5365,60 +4578,698 @@
             <p:ph type="title"/>
           </p:nvPr>
         </p:nvSpPr>
-        <p:spPr/>
-        <p:txBody>
-          <a:bodyPr>
-            <a:normAutofit fontScale="90000"/>
-          </a:bodyPr>
-          <a:lstStyle/>
-          <a:p>
-            <a:r>
-              <a:rPr lang="en-US" u="sng" dirty="0" smtClean="0"/>
-              <a:t>Decide on IDE/Programming Language/Database Tools</a:t>
-            </a:r>
-            <a:endParaRPr lang="en-US" dirty="0"/>
-          </a:p>
-        </p:txBody>
-      </p:sp>
-      <p:sp>
-        <p:nvSpPr>
-          <p:cNvPr id="5" name="TextBox 4"/>
-          <p:cNvSpPr txBox="1"/>
-          <p:nvPr/>
-        </p:nvSpPr>
         <p:spPr>
           <a:xfrm>
-            <a:off x="595085" y="1785258"/>
-            <a:ext cx="10892413" cy="738664"/>
+            <a:off x="1619794" y="0"/>
+            <a:ext cx="8878388" cy="731520"/>
           </a:xfrm>
-          <a:prstGeom prst="rect">
-            <a:avLst/>
-          </a:prstGeom>
-          <a:noFill/>
         </p:spPr>
         <p:txBody>
-          <a:bodyPr wrap="square" rtlCol="0">
-            <a:spAutoFit/>
+          <a:bodyPr>
+            <a:normAutofit/>
           </a:bodyPr>
           <a:lstStyle/>
           <a:p>
             <a:r>
-              <a:rPr lang="en-US" sz="2400" dirty="0" smtClean="0"/>
-              <a:t> </a:t>
-            </a:r>
-            <a:endParaRPr lang="en-US" sz="2400" dirty="0" smtClean="0"/>
-          </a:p>
-          <a:p>
-            <a:endParaRPr lang="en-US" dirty="0"/>
-          </a:p>
-        </p:txBody>
-      </p:sp>
+              <a:rPr lang="en-US" sz="3600" dirty="0" smtClean="0"/>
+              <a:t>Milestone 2 Role Distribution</a:t>
+            </a:r>
+            <a:endParaRPr lang="en-US" sz="3600" dirty="0"/>
+          </a:p>
+        </p:txBody>
+      </p:sp>
+      <p:graphicFrame>
+        <p:nvGraphicFramePr>
+          <p:cNvPr id="4" name="Content Placeholder 3"/>
+          <p:cNvGraphicFramePr>
+            <a:graphicFrameLocks noGrp="1"/>
+          </p:cNvGraphicFramePr>
+          <p:nvPr>
+            <p:ph idx="1"/>
+            <p:extLst>
+              <p:ext uri="{D42A27DB-BD31-4B8C-83A1-F6EECF244321}">
+                <p14:modId xmlns="" xmlns:p14="http://schemas.microsoft.com/office/powerpoint/2010/main" val="3271794229"/>
+              </p:ext>
+            </p:extLst>
+          </p:nvPr>
+        </p:nvGraphicFramePr>
+        <p:xfrm>
+          <a:off x="374469" y="913239"/>
+          <a:ext cx="11373395" cy="5012072"/>
+        </p:xfrm>
+        <a:graphic>
+          <a:graphicData uri="http://schemas.openxmlformats.org/drawingml/2006/table">
+            <a:tbl>
+              <a:tblPr firstRow="1" bandRow="1">
+                <a:tableStyleId>{5C22544A-7EE6-4342-B048-85BDC9FD1C3A}</a:tableStyleId>
+              </a:tblPr>
+              <a:tblGrid>
+                <a:gridCol w="2274679"/>
+                <a:gridCol w="2274679"/>
+                <a:gridCol w="2274679"/>
+                <a:gridCol w="2274679"/>
+                <a:gridCol w="2274679"/>
+              </a:tblGrid>
+              <a:tr h="602052">
+                <a:tc>
+                  <a:txBody>
+                    <a:bodyPr/>
+                    <a:lstStyle/>
+                    <a:p>
+                      <a:pPr marL="0" marR="0" algn="ctr">
+                        <a:spcBef>
+                          <a:spcPts val="0"/>
+                        </a:spcBef>
+                        <a:spcAft>
+                          <a:spcPts val="0"/>
+                        </a:spcAft>
+                      </a:pPr>
+                      <a:r>
+                        <a:rPr lang="en-US" sz="1800" dirty="0">
+                          <a:latin typeface="Calibri"/>
+                          <a:ea typeface="Calibri"/>
+                          <a:cs typeface="Times New Roman"/>
+                        </a:rPr>
+                        <a:t>Task</a:t>
+                      </a:r>
+                    </a:p>
+                  </a:txBody>
+                  <a:tcPr marL="68580" marR="68580" marT="0" marB="0"/>
+                </a:tc>
+                <a:tc>
+                  <a:txBody>
+                    <a:bodyPr/>
+                    <a:lstStyle/>
+                    <a:p>
+                      <a:pPr marL="0" marR="0" algn="ctr">
+                        <a:spcBef>
+                          <a:spcPts val="0"/>
+                        </a:spcBef>
+                        <a:spcAft>
+                          <a:spcPts val="0"/>
+                        </a:spcAft>
+                      </a:pPr>
+                      <a:r>
+                        <a:rPr lang="en-US" sz="1800" dirty="0">
+                          <a:latin typeface="Calibri"/>
+                          <a:ea typeface="Calibri"/>
+                          <a:cs typeface="Times New Roman"/>
+                        </a:rPr>
+                        <a:t>Kenneth Truex</a:t>
+                      </a:r>
+                    </a:p>
+                  </a:txBody>
+                  <a:tcPr marL="68580" marR="68580" marT="0" marB="0"/>
+                </a:tc>
+                <a:tc>
+                  <a:txBody>
+                    <a:bodyPr/>
+                    <a:lstStyle/>
+                    <a:p>
+                      <a:pPr marL="0" marR="0" algn="ctr">
+                        <a:spcBef>
+                          <a:spcPts val="0"/>
+                        </a:spcBef>
+                        <a:spcAft>
+                          <a:spcPts val="0"/>
+                        </a:spcAft>
+                      </a:pPr>
+                      <a:r>
+                        <a:rPr lang="en-US" sz="1800" dirty="0">
+                          <a:latin typeface="Calibri"/>
+                          <a:ea typeface="Calibri"/>
+                          <a:cs typeface="Times New Roman"/>
+                        </a:rPr>
+                        <a:t>Christopher Diebold</a:t>
+                      </a:r>
+                    </a:p>
+                  </a:txBody>
+                  <a:tcPr marL="68580" marR="68580" marT="0" marB="0"/>
+                </a:tc>
+                <a:tc>
+                  <a:txBody>
+                    <a:bodyPr/>
+                    <a:lstStyle/>
+                    <a:p>
+                      <a:pPr marL="0" marR="0" algn="ctr">
+                        <a:spcBef>
+                          <a:spcPts val="0"/>
+                        </a:spcBef>
+                        <a:spcAft>
+                          <a:spcPts val="0"/>
+                        </a:spcAft>
+                      </a:pPr>
+                      <a:r>
+                        <a:rPr lang="en-US" sz="1800" dirty="0">
+                          <a:latin typeface="Calibri"/>
+                          <a:ea typeface="Calibri"/>
+                          <a:cs typeface="Times New Roman"/>
+                        </a:rPr>
+                        <a:t>Chad Mason</a:t>
+                      </a:r>
+                    </a:p>
+                  </a:txBody>
+                  <a:tcPr marL="68580" marR="68580" marT="0" marB="0"/>
+                </a:tc>
+                <a:tc>
+                  <a:txBody>
+                    <a:bodyPr/>
+                    <a:lstStyle/>
+                    <a:p>
+                      <a:pPr marL="0" marR="0" algn="ctr">
+                        <a:spcBef>
+                          <a:spcPts val="0"/>
+                        </a:spcBef>
+                        <a:spcAft>
+                          <a:spcPts val="0"/>
+                        </a:spcAft>
+                      </a:pPr>
+                      <a:r>
+                        <a:rPr lang="en-US" sz="1800" dirty="0">
+                          <a:latin typeface="Calibri"/>
+                          <a:ea typeface="Calibri"/>
+                          <a:cs typeface="Times New Roman"/>
+                        </a:rPr>
+                        <a:t>Zachary McHenry</a:t>
+                      </a:r>
+                    </a:p>
+                  </a:txBody>
+                  <a:tcPr marL="68580" marR="68580" marT="0" marB="0"/>
+                </a:tc>
+              </a:tr>
+              <a:tr h="1102505">
+                <a:tc>
+                  <a:txBody>
+                    <a:bodyPr/>
+                    <a:lstStyle/>
+                    <a:p>
+                      <a:pPr marL="0" marR="0" algn="ctr">
+                        <a:spcBef>
+                          <a:spcPts val="0"/>
+                        </a:spcBef>
+                        <a:spcAft>
+                          <a:spcPts val="0"/>
+                        </a:spcAft>
+                      </a:pPr>
+                      <a:r>
+                        <a:rPr lang="en-US" sz="1600" dirty="0">
+                          <a:latin typeface="Calibri"/>
+                          <a:ea typeface="Calibri"/>
+                          <a:cs typeface="Times New Roman"/>
+                        </a:rPr>
+                        <a:t>Create the user forms</a:t>
+                      </a:r>
+                    </a:p>
+                  </a:txBody>
+                  <a:tcPr marL="68580" marR="68580" marT="0" marB="0"/>
+                </a:tc>
+                <a:tc>
+                  <a:txBody>
+                    <a:bodyPr/>
+                    <a:lstStyle/>
+                    <a:p>
+                      <a:pPr marL="0" marR="0" algn="ctr">
+                        <a:spcBef>
+                          <a:spcPts val="0"/>
+                        </a:spcBef>
+                        <a:spcAft>
+                          <a:spcPts val="0"/>
+                        </a:spcAft>
+                      </a:pPr>
+                      <a:r>
+                        <a:rPr lang="en-US" sz="1600">
+                          <a:latin typeface="Calibri"/>
+                          <a:ea typeface="Calibri"/>
+                          <a:cs typeface="Times New Roman"/>
+                        </a:rPr>
+                        <a:t>-</a:t>
+                      </a:r>
+                    </a:p>
+                  </a:txBody>
+                  <a:tcPr marL="68580" marR="68580" marT="0" marB="0"/>
+                </a:tc>
+                <a:tc>
+                  <a:txBody>
+                    <a:bodyPr/>
+                    <a:lstStyle/>
+                    <a:p>
+                      <a:pPr marL="0" marR="0" algn="ctr">
+                        <a:spcBef>
+                          <a:spcPts val="0"/>
+                        </a:spcBef>
+                        <a:spcAft>
+                          <a:spcPts val="0"/>
+                        </a:spcAft>
+                      </a:pPr>
+                      <a:r>
+                        <a:rPr lang="en-US" sz="1600">
+                          <a:latin typeface="Calibri"/>
+                          <a:ea typeface="Calibri"/>
+                          <a:cs typeface="Times New Roman"/>
+                        </a:rPr>
+                        <a:t>-</a:t>
+                      </a:r>
+                    </a:p>
+                  </a:txBody>
+                  <a:tcPr marL="68580" marR="68580" marT="0" marB="0"/>
+                </a:tc>
+                <a:tc>
+                  <a:txBody>
+                    <a:bodyPr/>
+                    <a:lstStyle/>
+                    <a:p>
+                      <a:pPr marL="0" marR="0" algn="ctr">
+                        <a:spcBef>
+                          <a:spcPts val="0"/>
+                        </a:spcBef>
+                        <a:spcAft>
+                          <a:spcPts val="0"/>
+                        </a:spcAft>
+                      </a:pPr>
+                      <a:r>
+                        <a:rPr lang="en-US" sz="1600">
+                          <a:latin typeface="Calibri"/>
+                          <a:ea typeface="Calibri"/>
+                          <a:cs typeface="Times New Roman"/>
+                        </a:rPr>
+                        <a:t>50%</a:t>
+                      </a:r>
+                    </a:p>
+                  </a:txBody>
+                  <a:tcPr marL="68580" marR="68580" marT="0" marB="0"/>
+                </a:tc>
+                <a:tc>
+                  <a:txBody>
+                    <a:bodyPr/>
+                    <a:lstStyle/>
+                    <a:p>
+                      <a:pPr marL="0" marR="0" algn="ctr">
+                        <a:spcBef>
+                          <a:spcPts val="0"/>
+                        </a:spcBef>
+                        <a:spcAft>
+                          <a:spcPts val="0"/>
+                        </a:spcAft>
+                      </a:pPr>
+                      <a:r>
+                        <a:rPr lang="en-US" sz="1600">
+                          <a:latin typeface="Calibri"/>
+                          <a:ea typeface="Calibri"/>
+                          <a:cs typeface="Times New Roman"/>
+                        </a:rPr>
+                        <a:t>50%</a:t>
+                      </a:r>
+                    </a:p>
+                  </a:txBody>
+                  <a:tcPr marL="68580" marR="68580" marT="0" marB="0"/>
+                </a:tc>
+              </a:tr>
+              <a:tr h="1102505">
+                <a:tc>
+                  <a:txBody>
+                    <a:bodyPr/>
+                    <a:lstStyle/>
+                    <a:p>
+                      <a:pPr marL="0" marR="0" algn="ctr">
+                        <a:spcBef>
+                          <a:spcPts val="0"/>
+                        </a:spcBef>
+                        <a:spcAft>
+                          <a:spcPts val="0"/>
+                        </a:spcAft>
+                      </a:pPr>
+                      <a:r>
+                        <a:rPr lang="en-US" sz="1600" dirty="0">
+                          <a:latin typeface="Calibri"/>
+                          <a:ea typeface="Calibri"/>
+                          <a:cs typeface="Times New Roman"/>
+                        </a:rPr>
+                        <a:t>Finish the algorithms</a:t>
+                      </a:r>
+                    </a:p>
+                  </a:txBody>
+                  <a:tcPr marL="68580" marR="68580" marT="0" marB="0"/>
+                </a:tc>
+                <a:tc>
+                  <a:txBody>
+                    <a:bodyPr/>
+                    <a:lstStyle/>
+                    <a:p>
+                      <a:pPr marL="0" marR="0" algn="ctr">
+                        <a:spcBef>
+                          <a:spcPts val="0"/>
+                        </a:spcBef>
+                        <a:spcAft>
+                          <a:spcPts val="0"/>
+                        </a:spcAft>
+                      </a:pPr>
+                      <a:r>
+                        <a:rPr lang="en-US" sz="1600" dirty="0">
+                          <a:latin typeface="Calibri"/>
+                          <a:ea typeface="Calibri"/>
+                          <a:cs typeface="Times New Roman"/>
+                        </a:rPr>
+                        <a:t>50%</a:t>
+                      </a:r>
+                    </a:p>
+                  </a:txBody>
+                  <a:tcPr marL="68580" marR="68580" marT="0" marB="0"/>
+                </a:tc>
+                <a:tc>
+                  <a:txBody>
+                    <a:bodyPr/>
+                    <a:lstStyle/>
+                    <a:p>
+                      <a:pPr marL="0" marR="0" algn="ctr">
+                        <a:spcBef>
+                          <a:spcPts val="0"/>
+                        </a:spcBef>
+                        <a:spcAft>
+                          <a:spcPts val="0"/>
+                        </a:spcAft>
+                      </a:pPr>
+                      <a:r>
+                        <a:rPr lang="en-US" sz="1600">
+                          <a:latin typeface="Calibri"/>
+                          <a:ea typeface="Calibri"/>
+                          <a:cs typeface="Times New Roman"/>
+                        </a:rPr>
+                        <a:t>-</a:t>
+                      </a:r>
+                    </a:p>
+                  </a:txBody>
+                  <a:tcPr marL="68580" marR="68580" marT="0" marB="0"/>
+                </a:tc>
+                <a:tc>
+                  <a:txBody>
+                    <a:bodyPr/>
+                    <a:lstStyle/>
+                    <a:p>
+                      <a:pPr marL="0" marR="0" algn="ctr">
+                        <a:spcBef>
+                          <a:spcPts val="0"/>
+                        </a:spcBef>
+                        <a:spcAft>
+                          <a:spcPts val="0"/>
+                        </a:spcAft>
+                      </a:pPr>
+                      <a:r>
+                        <a:rPr lang="en-US" sz="1600">
+                          <a:latin typeface="Calibri"/>
+                          <a:ea typeface="Calibri"/>
+                          <a:cs typeface="Times New Roman"/>
+                        </a:rPr>
+                        <a:t>-</a:t>
+                      </a:r>
+                    </a:p>
+                  </a:txBody>
+                  <a:tcPr marL="68580" marR="68580" marT="0" marB="0"/>
+                </a:tc>
+                <a:tc>
+                  <a:txBody>
+                    <a:bodyPr/>
+                    <a:lstStyle/>
+                    <a:p>
+                      <a:pPr marL="0" marR="0" algn="ctr">
+                        <a:spcBef>
+                          <a:spcPts val="0"/>
+                        </a:spcBef>
+                        <a:spcAft>
+                          <a:spcPts val="0"/>
+                        </a:spcAft>
+                      </a:pPr>
+                      <a:r>
+                        <a:rPr lang="en-US" sz="1600">
+                          <a:latin typeface="Calibri"/>
+                          <a:ea typeface="Calibri"/>
+                          <a:cs typeface="Times New Roman"/>
+                        </a:rPr>
+                        <a:t>-</a:t>
+                      </a:r>
+                    </a:p>
+                  </a:txBody>
+                  <a:tcPr marL="68580" marR="68580" marT="0" marB="0"/>
+                </a:tc>
+              </a:tr>
+              <a:tr h="1102505">
+                <a:tc>
+                  <a:txBody>
+                    <a:bodyPr/>
+                    <a:lstStyle/>
+                    <a:p>
+                      <a:pPr marL="0" marR="0" algn="ctr">
+                        <a:spcBef>
+                          <a:spcPts val="0"/>
+                        </a:spcBef>
+                        <a:spcAft>
+                          <a:spcPts val="0"/>
+                        </a:spcAft>
+                      </a:pPr>
+                      <a:r>
+                        <a:rPr lang="en-US" sz="1600">
+                          <a:latin typeface="Calibri"/>
+                          <a:ea typeface="Calibri"/>
+                          <a:cs typeface="Times New Roman"/>
+                        </a:rPr>
+                        <a:t>Query the database</a:t>
+                      </a:r>
+                    </a:p>
+                  </a:txBody>
+                  <a:tcPr marL="68580" marR="68580" marT="0" marB="0"/>
+                </a:tc>
+                <a:tc>
+                  <a:txBody>
+                    <a:bodyPr/>
+                    <a:lstStyle/>
+                    <a:p>
+                      <a:pPr marL="0" marR="0" algn="ctr">
+                        <a:spcBef>
+                          <a:spcPts val="0"/>
+                        </a:spcBef>
+                        <a:spcAft>
+                          <a:spcPts val="0"/>
+                        </a:spcAft>
+                      </a:pPr>
+                      <a:r>
+                        <a:rPr lang="en-US" sz="1600" dirty="0">
+                          <a:latin typeface="Calibri"/>
+                          <a:ea typeface="Calibri"/>
+                          <a:cs typeface="Times New Roman"/>
+                        </a:rPr>
+                        <a:t>50%</a:t>
+                      </a:r>
+                    </a:p>
+                  </a:txBody>
+                  <a:tcPr marL="68580" marR="68580" marT="0" marB="0"/>
+                </a:tc>
+                <a:tc>
+                  <a:txBody>
+                    <a:bodyPr/>
+                    <a:lstStyle/>
+                    <a:p>
+                      <a:pPr marL="0" marR="0" algn="ctr">
+                        <a:spcBef>
+                          <a:spcPts val="0"/>
+                        </a:spcBef>
+                        <a:spcAft>
+                          <a:spcPts val="0"/>
+                        </a:spcAft>
+                      </a:pPr>
+                      <a:r>
+                        <a:rPr lang="en-US" sz="1600" dirty="0">
+                          <a:latin typeface="Calibri"/>
+                          <a:ea typeface="Calibri"/>
+                          <a:cs typeface="Times New Roman"/>
+                        </a:rPr>
+                        <a:t>50%</a:t>
+                      </a:r>
+                    </a:p>
+                  </a:txBody>
+                  <a:tcPr marL="68580" marR="68580" marT="0" marB="0"/>
+                </a:tc>
+                <a:tc>
+                  <a:txBody>
+                    <a:bodyPr/>
+                    <a:lstStyle/>
+                    <a:p>
+                      <a:pPr marL="0" marR="0" algn="ctr">
+                        <a:spcBef>
+                          <a:spcPts val="0"/>
+                        </a:spcBef>
+                        <a:spcAft>
+                          <a:spcPts val="0"/>
+                        </a:spcAft>
+                      </a:pPr>
+                      <a:r>
+                        <a:rPr lang="en-US" sz="1600" dirty="0">
+                          <a:latin typeface="Calibri"/>
+                          <a:ea typeface="Calibri"/>
+                          <a:cs typeface="Times New Roman"/>
+                        </a:rPr>
+                        <a:t>-</a:t>
+                      </a:r>
+                    </a:p>
+                  </a:txBody>
+                  <a:tcPr marL="68580" marR="68580" marT="0" marB="0"/>
+                </a:tc>
+                <a:tc>
+                  <a:txBody>
+                    <a:bodyPr/>
+                    <a:lstStyle/>
+                    <a:p>
+                      <a:pPr marL="0" marR="0" algn="ctr">
+                        <a:spcBef>
+                          <a:spcPts val="0"/>
+                        </a:spcBef>
+                        <a:spcAft>
+                          <a:spcPts val="0"/>
+                        </a:spcAft>
+                      </a:pPr>
+                      <a:r>
+                        <a:rPr lang="en-US" sz="1600">
+                          <a:latin typeface="Calibri"/>
+                          <a:ea typeface="Calibri"/>
+                          <a:cs typeface="Times New Roman"/>
+                        </a:rPr>
+                        <a:t>-</a:t>
+                      </a:r>
+                    </a:p>
+                  </a:txBody>
+                  <a:tcPr marL="68580" marR="68580" marT="0" marB="0"/>
+                </a:tc>
+              </a:tr>
+              <a:tr h="1102505">
+                <a:tc>
+                  <a:txBody>
+                    <a:bodyPr/>
+                    <a:lstStyle/>
+                    <a:p>
+                      <a:pPr marL="0" marR="0" algn="ctr">
+                        <a:spcBef>
+                          <a:spcPts val="0"/>
+                        </a:spcBef>
+                        <a:spcAft>
+                          <a:spcPts val="0"/>
+                        </a:spcAft>
+                      </a:pPr>
+                      <a:r>
+                        <a:rPr lang="en-US" sz="1600">
+                          <a:latin typeface="Calibri"/>
+                          <a:ea typeface="Calibri"/>
+                          <a:cs typeface="Times New Roman"/>
+                        </a:rPr>
+                        <a:t>Look into multithreading</a:t>
+                      </a:r>
+                    </a:p>
+                  </a:txBody>
+                  <a:tcPr marL="68580" marR="68580" marT="0" marB="0"/>
+                </a:tc>
+                <a:tc>
+                  <a:txBody>
+                    <a:bodyPr/>
+                    <a:lstStyle/>
+                    <a:p>
+                      <a:pPr marL="0" marR="0" algn="ctr">
+                        <a:spcBef>
+                          <a:spcPts val="0"/>
+                        </a:spcBef>
+                        <a:spcAft>
+                          <a:spcPts val="0"/>
+                        </a:spcAft>
+                      </a:pPr>
+                      <a:r>
+                        <a:rPr lang="en-US" sz="1600">
+                          <a:latin typeface="Calibri"/>
+                          <a:ea typeface="Calibri"/>
+                          <a:cs typeface="Times New Roman"/>
+                        </a:rPr>
+                        <a:t>-</a:t>
+                      </a:r>
+                    </a:p>
+                  </a:txBody>
+                  <a:tcPr marL="68580" marR="68580" marT="0" marB="0"/>
+                </a:tc>
+                <a:tc>
+                  <a:txBody>
+                    <a:bodyPr/>
+                    <a:lstStyle/>
+                    <a:p>
+                      <a:pPr marL="0" marR="0" algn="ctr">
+                        <a:spcBef>
+                          <a:spcPts val="0"/>
+                        </a:spcBef>
+                        <a:spcAft>
+                          <a:spcPts val="0"/>
+                        </a:spcAft>
+                      </a:pPr>
+                      <a:r>
+                        <a:rPr lang="en-US" sz="1600">
+                          <a:latin typeface="Calibri"/>
+                          <a:ea typeface="Calibri"/>
+                          <a:cs typeface="Times New Roman"/>
+                        </a:rPr>
+                        <a:t>50%</a:t>
+                      </a:r>
+                    </a:p>
+                  </a:txBody>
+                  <a:tcPr marL="68580" marR="68580" marT="0" marB="0"/>
+                </a:tc>
+                <a:tc>
+                  <a:txBody>
+                    <a:bodyPr/>
+                    <a:lstStyle/>
+                    <a:p>
+                      <a:pPr marL="0" marR="0" algn="ctr">
+                        <a:spcBef>
+                          <a:spcPts val="0"/>
+                        </a:spcBef>
+                        <a:spcAft>
+                          <a:spcPts val="0"/>
+                        </a:spcAft>
+                      </a:pPr>
+                      <a:r>
+                        <a:rPr lang="en-US" sz="1600" dirty="0">
+                          <a:latin typeface="Calibri"/>
+                          <a:ea typeface="Calibri"/>
+                          <a:cs typeface="Times New Roman"/>
+                        </a:rPr>
+                        <a:t>50%</a:t>
+                      </a:r>
+                    </a:p>
+                  </a:txBody>
+                  <a:tcPr marL="68580" marR="68580" marT="0" marB="0"/>
+                </a:tc>
+                <a:tc>
+                  <a:txBody>
+                    <a:bodyPr/>
+                    <a:lstStyle/>
+                    <a:p>
+                      <a:pPr marL="0" marR="0" algn="ctr">
+                        <a:spcBef>
+                          <a:spcPts val="0"/>
+                        </a:spcBef>
+                        <a:spcAft>
+                          <a:spcPts val="0"/>
+                        </a:spcAft>
+                      </a:pPr>
+                      <a:r>
+                        <a:rPr lang="en-US" sz="1600" dirty="0">
+                          <a:latin typeface="Calibri"/>
+                          <a:ea typeface="Calibri"/>
+                          <a:cs typeface="Times New Roman"/>
+                        </a:rPr>
+                        <a:t>50%</a:t>
+                      </a:r>
+                    </a:p>
+                  </a:txBody>
+                  <a:tcPr marL="68580" marR="68580" marT="0" marB="0"/>
+                </a:tc>
+              </a:tr>
+            </a:tbl>
+          </a:graphicData>
+        </a:graphic>
+      </p:graphicFrame>
     </p:spTree>
-    <p:extLst>
-      <p:ext uri="{BB962C8B-B14F-4D97-AF65-F5344CB8AC3E}">
-        <p14:creationId xmlns:p14="http://schemas.microsoft.com/office/powerpoint/2010/main" val="4270080904"/>
-      </p:ext>
-    </p:extLst>
   </p:cSld>
   <p:clrMapOvr>
     <a:masterClrMapping/>
@@ -5443,41 +5294,39 @@
           <a:chExt cx="0" cy="0"/>
         </a:xfrm>
       </p:grpSpPr>
-      <p:sp>
-        <p:nvSpPr>
-          <p:cNvPr id="2" name="Title 1"/>
-          <p:cNvSpPr>
-            <a:spLocks noGrp="1"/>
-          </p:cNvSpPr>
-          <p:nvPr>
-            <p:ph type="title"/>
-          </p:nvPr>
-        </p:nvSpPr>
-        <p:spPr/>
-        <p:txBody>
-          <a:bodyPr>
-            <a:normAutofit fontScale="90000"/>
-          </a:bodyPr>
-          <a:lstStyle/>
-          <a:p>
-            <a:r>
-              <a:rPr lang="en-US" u="sng" dirty="0" smtClean="0"/>
-              <a:t>Evaluate Selected Tools with Small Examples to Analyze Integration/Cohesiveness of Tools:</a:t>
-            </a:r>
-            <a:endParaRPr lang="en-US" dirty="0"/>
-          </a:p>
-        </p:txBody>
-      </p:sp>
-      <p:sp>
-        <p:nvSpPr>
-          <p:cNvPr id="5" name="TextBox 4"/>
+      <p:pic>
+        <p:nvPicPr>
+          <p:cNvPr id="6" name="Content Placeholder 5" descr="getrains3.jpg"/>
+          <p:cNvPicPr>
+            <a:picLocks noGrp="1" noChangeAspect="1"/>
+          </p:cNvPicPr>
+          <p:nvPr>
+            <p:ph idx="1"/>
+          </p:nvPr>
+        </p:nvPicPr>
+        <p:blipFill>
+          <a:blip r:embed="rId2" cstate="print"/>
+          <a:stretch>
+            <a:fillRect/>
+          </a:stretch>
+        </p:blipFill>
+        <p:spPr>
+          <a:xfrm>
+            <a:off x="22706" y="5871"/>
+            <a:ext cx="12169294" cy="6794471"/>
+          </a:xfrm>
+        </p:spPr>
+      </p:pic>
+      <p:sp>
+        <p:nvSpPr>
+          <p:cNvPr id="7" name="TextBox 6"/>
           <p:cNvSpPr txBox="1"/>
           <p:nvPr/>
         </p:nvSpPr>
         <p:spPr>
           <a:xfrm>
-            <a:off x="595085" y="1785258"/>
-            <a:ext cx="10892413" cy="738664"/>
+            <a:off x="169818" y="195943"/>
+            <a:ext cx="5081840" cy="923330"/>
           </a:xfrm>
           <a:prstGeom prst="rect">
             <a:avLst/>
@@ -5485,28 +5334,28 @@
           <a:noFill/>
         </p:spPr>
         <p:txBody>
-          <a:bodyPr wrap="square" rtlCol="0">
+          <a:bodyPr wrap="none" rtlCol="0">
             <a:spAutoFit/>
           </a:bodyPr>
           <a:lstStyle/>
           <a:p>
             <a:r>
-              <a:rPr lang="en-US" sz="2400" dirty="0" smtClean="0"/>
-              <a:t> </a:t>
-            </a:r>
-            <a:endParaRPr lang="en-US" sz="2400" dirty="0" smtClean="0"/>
-          </a:p>
-          <a:p>
-            <a:endParaRPr lang="en-US" dirty="0"/>
+              <a:rPr lang="en-US" sz="5400" dirty="0" smtClean="0">
+                <a:solidFill>
+                  <a:schemeClr val="bg1"/>
+                </a:solidFill>
+              </a:rPr>
+              <a:t>Any Questions?</a:t>
+            </a:r>
+            <a:endParaRPr lang="en-US" sz="5400" dirty="0">
+              <a:solidFill>
+                <a:schemeClr val="bg1"/>
+              </a:solidFill>
+            </a:endParaRPr>
           </a:p>
         </p:txBody>
       </p:sp>
     </p:spTree>
-    <p:extLst>
-      <p:ext uri="{BB962C8B-B14F-4D97-AF65-F5344CB8AC3E}">
-        <p14:creationId xmlns:p14="http://schemas.microsoft.com/office/powerpoint/2010/main" val="4270080904"/>
-      </p:ext>
-    </p:extLst>
   </p:cSld>
   <p:clrMapOvr>
     <a:masterClrMapping/>

</xml_diff>